<commit_message>
updated week 2 materials
</commit_message>
<xml_diff>
--- a/Week_2/BI694_Week_2.pptx
+++ b/Week_2/BI694_Week_2.pptx
@@ -4,6 +4,9 @@
   <p:sldMasterIdLst>
     <p:sldMasterId id="2147483648" r:id="rId1"/>
   </p:sldMasterIdLst>
+  <p:notesMasterIdLst>
+    <p:notesMasterId r:id="rId19"/>
+  </p:notesMasterIdLst>
   <p:sldIdLst>
     <p:sldId id="256" r:id="rId2"/>
     <p:sldId id="258" r:id="rId3"/>
@@ -15,15 +18,13 @@
     <p:sldId id="269" r:id="rId9"/>
     <p:sldId id="273" r:id="rId10"/>
     <p:sldId id="274" r:id="rId11"/>
-    <p:sldId id="261" r:id="rId12"/>
-    <p:sldId id="262" r:id="rId13"/>
-    <p:sldId id="270" r:id="rId14"/>
-    <p:sldId id="272" r:id="rId15"/>
-    <p:sldId id="263" r:id="rId16"/>
-    <p:sldId id="264" r:id="rId17"/>
-    <p:sldId id="265" r:id="rId18"/>
-    <p:sldId id="271" r:id="rId19"/>
-    <p:sldId id="275" r:id="rId20"/>
+    <p:sldId id="270" r:id="rId12"/>
+    <p:sldId id="276" r:id="rId13"/>
+    <p:sldId id="272" r:id="rId14"/>
+    <p:sldId id="261" r:id="rId15"/>
+    <p:sldId id="262" r:id="rId16"/>
+    <p:sldId id="263" r:id="rId17"/>
+    <p:sldId id="275" r:id="rId18"/>
   </p:sldIdLst>
   <p:sldSz cx="12192000" cy="6858000"/>
   <p:notesSz cx="6858000" cy="9144000"/>
@@ -130,6 +131,356 @@
 </p:presentation>
 </file>
 
+<file path=ppt/notesMasters/notesMaster1.xml><?xml version="1.0" encoding="utf-8"?>
+<p:notesMaster xmlns:a="http://schemas.openxmlformats.org/drawingml/2006/main" xmlns:r="http://schemas.openxmlformats.org/officeDocument/2006/relationships" xmlns:p="http://schemas.openxmlformats.org/presentationml/2006/main">
+  <p:cSld>
+    <p:bg>
+      <p:bgRef idx="1001">
+        <a:schemeClr val="bg1"/>
+      </p:bgRef>
+    </p:bg>
+    <p:spTree>
+      <p:nvGrpSpPr>
+        <p:cNvPr id="1" name=""/>
+        <p:cNvGrpSpPr/>
+        <p:nvPr/>
+      </p:nvGrpSpPr>
+      <p:grpSpPr>
+        <a:xfrm>
+          <a:off x="0" y="0"/>
+          <a:ext cx="0" cy="0"/>
+          <a:chOff x="0" y="0"/>
+          <a:chExt cx="0" cy="0"/>
+        </a:xfrm>
+      </p:grpSpPr>
+      <p:sp>
+        <p:nvSpPr>
+          <p:cNvPr id="2" name="Header Placeholder 1"/>
+          <p:cNvSpPr>
+            <a:spLocks noGrp="1"/>
+          </p:cNvSpPr>
+          <p:nvPr>
+            <p:ph type="hdr" sz="quarter"/>
+          </p:nvPr>
+        </p:nvSpPr>
+        <p:spPr>
+          <a:xfrm>
+            <a:off x="0" y="0"/>
+            <a:ext cx="2971800" cy="458788"/>
+          </a:xfrm>
+          <a:prstGeom prst="rect">
+            <a:avLst/>
+          </a:prstGeom>
+        </p:spPr>
+        <p:txBody>
+          <a:bodyPr vert="horz" lIns="91440" tIns="45720" rIns="91440" bIns="45720" rtlCol="0"/>
+          <a:lstStyle>
+            <a:lvl1pPr algn="l">
+              <a:defRPr sz="1200"/>
+            </a:lvl1pPr>
+          </a:lstStyle>
+          <a:p>
+            <a:endParaRPr lang="en-US"/>
+          </a:p>
+        </p:txBody>
+      </p:sp>
+      <p:sp>
+        <p:nvSpPr>
+          <p:cNvPr id="3" name="Date Placeholder 2"/>
+          <p:cNvSpPr>
+            <a:spLocks noGrp="1"/>
+          </p:cNvSpPr>
+          <p:nvPr>
+            <p:ph type="dt" idx="1"/>
+          </p:nvPr>
+        </p:nvSpPr>
+        <p:spPr>
+          <a:xfrm>
+            <a:off x="3884613" y="0"/>
+            <a:ext cx="2971800" cy="458788"/>
+          </a:xfrm>
+          <a:prstGeom prst="rect">
+            <a:avLst/>
+          </a:prstGeom>
+        </p:spPr>
+        <p:txBody>
+          <a:bodyPr vert="horz" lIns="91440" tIns="45720" rIns="91440" bIns="45720" rtlCol="0"/>
+          <a:lstStyle>
+            <a:lvl1pPr algn="r">
+              <a:defRPr sz="1200"/>
+            </a:lvl1pPr>
+          </a:lstStyle>
+          <a:p>
+            <a:fld id="{51CD5176-53DF-9A47-AC72-E72A5AFCA4BA}" type="datetimeFigureOut">
+              <a:rPr lang="en-US" smtClean="0"/>
+              <a:t>8/27/17</a:t>
+            </a:fld>
+            <a:endParaRPr lang="en-US"/>
+          </a:p>
+        </p:txBody>
+      </p:sp>
+      <p:sp>
+        <p:nvSpPr>
+          <p:cNvPr id="4" name="Slide Image Placeholder 3"/>
+          <p:cNvSpPr>
+            <a:spLocks noGrp="1" noRot="1" noChangeAspect="1"/>
+          </p:cNvSpPr>
+          <p:nvPr>
+            <p:ph type="sldImg" idx="2"/>
+          </p:nvPr>
+        </p:nvSpPr>
+        <p:spPr>
+          <a:xfrm>
+            <a:off x="685800" y="1143000"/>
+            <a:ext cx="5486400" cy="3086100"/>
+          </a:xfrm>
+          <a:prstGeom prst="rect">
+            <a:avLst/>
+          </a:prstGeom>
+          <a:noFill/>
+          <a:ln w="12700">
+            <a:solidFill>
+              <a:prstClr val="black"/>
+            </a:solidFill>
+          </a:ln>
+        </p:spPr>
+        <p:txBody>
+          <a:bodyPr vert="horz" lIns="91440" tIns="45720" rIns="91440" bIns="45720" rtlCol="0" anchor="ctr"/>
+          <a:lstStyle/>
+          <a:p>
+            <a:endParaRPr lang="en-US"/>
+          </a:p>
+        </p:txBody>
+      </p:sp>
+      <p:sp>
+        <p:nvSpPr>
+          <p:cNvPr id="5" name="Notes Placeholder 4"/>
+          <p:cNvSpPr>
+            <a:spLocks noGrp="1"/>
+          </p:cNvSpPr>
+          <p:nvPr>
+            <p:ph type="body" sz="quarter" idx="3"/>
+          </p:nvPr>
+        </p:nvSpPr>
+        <p:spPr>
+          <a:xfrm>
+            <a:off x="685800" y="4400550"/>
+            <a:ext cx="5486400" cy="3600450"/>
+          </a:xfrm>
+          <a:prstGeom prst="rect">
+            <a:avLst/>
+          </a:prstGeom>
+        </p:spPr>
+        <p:txBody>
+          <a:bodyPr vert="horz" lIns="91440" tIns="45720" rIns="91440" bIns="45720" rtlCol="0"/>
+          <a:lstStyle/>
+          <a:p>
+            <a:pPr lvl="0"/>
+            <a:r>
+              <a:rPr lang="en-US" smtClean="0"/>
+              <a:t>Click to edit Master text styles</a:t>
+            </a:r>
+          </a:p>
+          <a:p>
+            <a:pPr lvl="1"/>
+            <a:r>
+              <a:rPr lang="en-US" smtClean="0"/>
+              <a:t>Second level</a:t>
+            </a:r>
+          </a:p>
+          <a:p>
+            <a:pPr lvl="2"/>
+            <a:r>
+              <a:rPr lang="en-US" smtClean="0"/>
+              <a:t>Third level</a:t>
+            </a:r>
+          </a:p>
+          <a:p>
+            <a:pPr lvl="3"/>
+            <a:r>
+              <a:rPr lang="en-US" smtClean="0"/>
+              <a:t>Fourth level</a:t>
+            </a:r>
+          </a:p>
+          <a:p>
+            <a:pPr lvl="4"/>
+            <a:r>
+              <a:rPr lang="en-US" smtClean="0"/>
+              <a:t>Fifth level</a:t>
+            </a:r>
+            <a:endParaRPr lang="en-US"/>
+          </a:p>
+        </p:txBody>
+      </p:sp>
+      <p:sp>
+        <p:nvSpPr>
+          <p:cNvPr id="6" name="Footer Placeholder 5"/>
+          <p:cNvSpPr>
+            <a:spLocks noGrp="1"/>
+          </p:cNvSpPr>
+          <p:nvPr>
+            <p:ph type="ftr" sz="quarter" idx="4"/>
+          </p:nvPr>
+        </p:nvSpPr>
+        <p:spPr>
+          <a:xfrm>
+            <a:off x="0" y="8685213"/>
+            <a:ext cx="2971800" cy="458787"/>
+          </a:xfrm>
+          <a:prstGeom prst="rect">
+            <a:avLst/>
+          </a:prstGeom>
+        </p:spPr>
+        <p:txBody>
+          <a:bodyPr vert="horz" lIns="91440" tIns="45720" rIns="91440" bIns="45720" rtlCol="0" anchor="b"/>
+          <a:lstStyle>
+            <a:lvl1pPr algn="l">
+              <a:defRPr sz="1200"/>
+            </a:lvl1pPr>
+          </a:lstStyle>
+          <a:p>
+            <a:endParaRPr lang="en-US"/>
+          </a:p>
+        </p:txBody>
+      </p:sp>
+      <p:sp>
+        <p:nvSpPr>
+          <p:cNvPr id="7" name="Slide Number Placeholder 6"/>
+          <p:cNvSpPr>
+            <a:spLocks noGrp="1"/>
+          </p:cNvSpPr>
+          <p:nvPr>
+            <p:ph type="sldNum" sz="quarter" idx="5"/>
+          </p:nvPr>
+        </p:nvSpPr>
+        <p:spPr>
+          <a:xfrm>
+            <a:off x="3884613" y="8685213"/>
+            <a:ext cx="2971800" cy="458787"/>
+          </a:xfrm>
+          <a:prstGeom prst="rect">
+            <a:avLst/>
+          </a:prstGeom>
+        </p:spPr>
+        <p:txBody>
+          <a:bodyPr vert="horz" lIns="91440" tIns="45720" rIns="91440" bIns="45720" rtlCol="0" anchor="b"/>
+          <a:lstStyle>
+            <a:lvl1pPr algn="r">
+              <a:defRPr sz="1200"/>
+            </a:lvl1pPr>
+          </a:lstStyle>
+          <a:p>
+            <a:fld id="{4A8E52DE-B85F-DA4A-BBAD-29136969E46D}" type="slidenum">
+              <a:rPr lang="en-US" smtClean="0"/>
+              <a:t>‹#›</a:t>
+            </a:fld>
+            <a:endParaRPr lang="en-US"/>
+          </a:p>
+        </p:txBody>
+      </p:sp>
+    </p:spTree>
+    <p:extLst>
+      <p:ext uri="{BB962C8B-B14F-4D97-AF65-F5344CB8AC3E}">
+        <p14:creationId xmlns:p14="http://schemas.microsoft.com/office/powerpoint/2010/main" val="1793799502"/>
+      </p:ext>
+    </p:extLst>
+  </p:cSld>
+  <p:clrMap bg1="lt1" tx1="dk1" bg2="lt2" tx2="dk2" accent1="accent1" accent2="accent2" accent3="accent3" accent4="accent4" accent5="accent5" accent6="accent6" hlink="hlink" folHlink="folHlink"/>
+  <p:notesStyle>
+    <a:lvl1pPr marL="0" algn="l" defTabSz="914400" rtl="0" eaLnBrk="1" latinLnBrk="0" hangingPunct="1">
+      <a:defRPr sz="1200" kern="1200">
+        <a:solidFill>
+          <a:schemeClr val="tx1"/>
+        </a:solidFill>
+        <a:latin typeface="+mn-lt"/>
+        <a:ea typeface="+mn-ea"/>
+        <a:cs typeface="+mn-cs"/>
+      </a:defRPr>
+    </a:lvl1pPr>
+    <a:lvl2pPr marL="457200" algn="l" defTabSz="914400" rtl="0" eaLnBrk="1" latinLnBrk="0" hangingPunct="1">
+      <a:defRPr sz="1200" kern="1200">
+        <a:solidFill>
+          <a:schemeClr val="tx1"/>
+        </a:solidFill>
+        <a:latin typeface="+mn-lt"/>
+        <a:ea typeface="+mn-ea"/>
+        <a:cs typeface="+mn-cs"/>
+      </a:defRPr>
+    </a:lvl2pPr>
+    <a:lvl3pPr marL="914400" algn="l" defTabSz="914400" rtl="0" eaLnBrk="1" latinLnBrk="0" hangingPunct="1">
+      <a:defRPr sz="1200" kern="1200">
+        <a:solidFill>
+          <a:schemeClr val="tx1"/>
+        </a:solidFill>
+        <a:latin typeface="+mn-lt"/>
+        <a:ea typeface="+mn-ea"/>
+        <a:cs typeface="+mn-cs"/>
+      </a:defRPr>
+    </a:lvl3pPr>
+    <a:lvl4pPr marL="1371600" algn="l" defTabSz="914400" rtl="0" eaLnBrk="1" latinLnBrk="0" hangingPunct="1">
+      <a:defRPr sz="1200" kern="1200">
+        <a:solidFill>
+          <a:schemeClr val="tx1"/>
+        </a:solidFill>
+        <a:latin typeface="+mn-lt"/>
+        <a:ea typeface="+mn-ea"/>
+        <a:cs typeface="+mn-cs"/>
+      </a:defRPr>
+    </a:lvl4pPr>
+    <a:lvl5pPr marL="1828800" algn="l" defTabSz="914400" rtl="0" eaLnBrk="1" latinLnBrk="0" hangingPunct="1">
+      <a:defRPr sz="1200" kern="1200">
+        <a:solidFill>
+          <a:schemeClr val="tx1"/>
+        </a:solidFill>
+        <a:latin typeface="+mn-lt"/>
+        <a:ea typeface="+mn-ea"/>
+        <a:cs typeface="+mn-cs"/>
+      </a:defRPr>
+    </a:lvl5pPr>
+    <a:lvl6pPr marL="2286000" algn="l" defTabSz="914400" rtl="0" eaLnBrk="1" latinLnBrk="0" hangingPunct="1">
+      <a:defRPr sz="1200" kern="1200">
+        <a:solidFill>
+          <a:schemeClr val="tx1"/>
+        </a:solidFill>
+        <a:latin typeface="+mn-lt"/>
+        <a:ea typeface="+mn-ea"/>
+        <a:cs typeface="+mn-cs"/>
+      </a:defRPr>
+    </a:lvl6pPr>
+    <a:lvl7pPr marL="2743200" algn="l" defTabSz="914400" rtl="0" eaLnBrk="1" latinLnBrk="0" hangingPunct="1">
+      <a:defRPr sz="1200" kern="1200">
+        <a:solidFill>
+          <a:schemeClr val="tx1"/>
+        </a:solidFill>
+        <a:latin typeface="+mn-lt"/>
+        <a:ea typeface="+mn-ea"/>
+        <a:cs typeface="+mn-cs"/>
+      </a:defRPr>
+    </a:lvl7pPr>
+    <a:lvl8pPr marL="3200400" algn="l" defTabSz="914400" rtl="0" eaLnBrk="1" latinLnBrk="0" hangingPunct="1">
+      <a:defRPr sz="1200" kern="1200">
+        <a:solidFill>
+          <a:schemeClr val="tx1"/>
+        </a:solidFill>
+        <a:latin typeface="+mn-lt"/>
+        <a:ea typeface="+mn-ea"/>
+        <a:cs typeface="+mn-cs"/>
+      </a:defRPr>
+    </a:lvl8pPr>
+    <a:lvl9pPr marL="3657600" algn="l" defTabSz="914400" rtl="0" eaLnBrk="1" latinLnBrk="0" hangingPunct="1">
+      <a:defRPr sz="1200" kern="1200">
+        <a:solidFill>
+          <a:schemeClr val="tx1"/>
+        </a:solidFill>
+        <a:latin typeface="+mn-lt"/>
+        <a:ea typeface="+mn-ea"/>
+        <a:cs typeface="+mn-cs"/>
+      </a:defRPr>
+    </a:lvl9pPr>
+  </p:notesStyle>
+</p:notesMaster>
+</file>
+
 <file path=ppt/slideLayouts/slideLayout1.xml><?xml version="1.0" encoding="utf-8"?>
 <p:sldLayout xmlns:a="http://schemas.openxmlformats.org/drawingml/2006/main" xmlns:r="http://schemas.openxmlformats.org/officeDocument/2006/relationships" xmlns:p="http://schemas.openxmlformats.org/presentationml/2006/main" type="title" preserve="1">
   <p:cSld name="Title Slide">
@@ -261,7 +612,7 @@
           <a:p>
             <a:fld id="{FC956F68-06DC-FE4D-941A-551DCF545346}" type="datetimeFigureOut">
               <a:rPr lang="en-US" smtClean="0"/>
-              <a:t>8/20/17</a:t>
+              <a:t>8/27/17</a:t>
             </a:fld>
             <a:endParaRPr lang="en-US"/>
           </a:p>
@@ -431,7 +782,7 @@
           <a:p>
             <a:fld id="{FC956F68-06DC-FE4D-941A-551DCF545346}" type="datetimeFigureOut">
               <a:rPr lang="en-US" smtClean="0"/>
-              <a:t>8/20/17</a:t>
+              <a:t>8/27/17</a:t>
             </a:fld>
             <a:endParaRPr lang="en-US"/>
           </a:p>
@@ -611,7 +962,7 @@
           <a:p>
             <a:fld id="{FC956F68-06DC-FE4D-941A-551DCF545346}" type="datetimeFigureOut">
               <a:rPr lang="en-US" smtClean="0"/>
-              <a:t>8/20/17</a:t>
+              <a:t>8/27/17</a:t>
             </a:fld>
             <a:endParaRPr lang="en-US"/>
           </a:p>
@@ -781,7 +1132,7 @@
           <a:p>
             <a:fld id="{FC956F68-06DC-FE4D-941A-551DCF545346}" type="datetimeFigureOut">
               <a:rPr lang="en-US" smtClean="0"/>
-              <a:t>8/20/17</a:t>
+              <a:t>8/27/17</a:t>
             </a:fld>
             <a:endParaRPr lang="en-US"/>
           </a:p>
@@ -1027,7 +1378,7 @@
           <a:p>
             <a:fld id="{FC956F68-06DC-FE4D-941A-551DCF545346}" type="datetimeFigureOut">
               <a:rPr lang="en-US" smtClean="0"/>
-              <a:t>8/20/17</a:t>
+              <a:t>8/27/17</a:t>
             </a:fld>
             <a:endParaRPr lang="en-US"/>
           </a:p>
@@ -1259,7 +1610,7 @@
           <a:p>
             <a:fld id="{FC956F68-06DC-FE4D-941A-551DCF545346}" type="datetimeFigureOut">
               <a:rPr lang="en-US" smtClean="0"/>
-              <a:t>8/20/17</a:t>
+              <a:t>8/27/17</a:t>
             </a:fld>
             <a:endParaRPr lang="en-US"/>
           </a:p>
@@ -1626,7 +1977,7 @@
           <a:p>
             <a:fld id="{FC956F68-06DC-FE4D-941A-551DCF545346}" type="datetimeFigureOut">
               <a:rPr lang="en-US" smtClean="0"/>
-              <a:t>8/20/17</a:t>
+              <a:t>8/27/17</a:t>
             </a:fld>
             <a:endParaRPr lang="en-US"/>
           </a:p>
@@ -1744,7 +2095,7 @@
           <a:p>
             <a:fld id="{FC956F68-06DC-FE4D-941A-551DCF545346}" type="datetimeFigureOut">
               <a:rPr lang="en-US" smtClean="0"/>
-              <a:t>8/20/17</a:t>
+              <a:t>8/27/17</a:t>
             </a:fld>
             <a:endParaRPr lang="en-US"/>
           </a:p>
@@ -1839,7 +2190,7 @@
           <a:p>
             <a:fld id="{FC956F68-06DC-FE4D-941A-551DCF545346}" type="datetimeFigureOut">
               <a:rPr lang="en-US" smtClean="0"/>
-              <a:t>8/20/17</a:t>
+              <a:t>8/27/17</a:t>
             </a:fld>
             <a:endParaRPr lang="en-US"/>
           </a:p>
@@ -2116,7 +2467,7 @@
           <a:p>
             <a:fld id="{FC956F68-06DC-FE4D-941A-551DCF545346}" type="datetimeFigureOut">
               <a:rPr lang="en-US" smtClean="0"/>
-              <a:t>8/20/17</a:t>
+              <a:t>8/27/17</a:t>
             </a:fld>
             <a:endParaRPr lang="en-US"/>
           </a:p>
@@ -2369,7 +2720,7 @@
           <a:p>
             <a:fld id="{FC956F68-06DC-FE4D-941A-551DCF545346}" type="datetimeFigureOut">
               <a:rPr lang="en-US" smtClean="0"/>
-              <a:t>8/20/17</a:t>
+              <a:t>8/27/17</a:t>
             </a:fld>
             <a:endParaRPr lang="en-US"/>
           </a:p>
@@ -2582,7 +2933,7 @@
           <a:p>
             <a:fld id="{FC956F68-06DC-FE4D-941A-551DCF545346}" type="datetimeFigureOut">
               <a:rPr lang="en-US" smtClean="0"/>
-              <a:t>8/20/17</a:t>
+              <a:t>8/27/17</a:t>
             </a:fld>
             <a:endParaRPr lang="en-US"/>
           </a:p>
@@ -3056,11 +3407,7 @@
           <a:p>
             <a:r>
               <a:rPr lang="en-US" dirty="0" smtClean="0"/>
-              <a:t>Winter Semester </a:t>
-            </a:r>
-            <a:r>
-              <a:rPr lang="en-US" dirty="0" smtClean="0"/>
-              <a:t>2017</a:t>
+              <a:t>Winter Semester 2017</a:t>
             </a:r>
           </a:p>
           <a:p>
@@ -3114,7 +3461,7 @@
       </p:grpSpPr>
       <p:pic>
         <p:nvPicPr>
-          <p:cNvPr id="2050" name="Picture 2" descr="ttp://www.gocit.vn/wp-content/uploads/2015/09/Linux-file-system-hierarchy-Linux-file-structure-optimized"/>
+          <p:cNvPr id="5" name="Picture 2" descr="ttp://www.gocit.vn/wp-content/uploads/2015/09/Linux-file-system-hierarchy-Linux-file-structure-optimized"/>
           <p:cNvPicPr>
             <a:picLocks noChangeAspect="1" noChangeArrowheads="1"/>
           </p:cNvPicPr>
@@ -3135,7 +3482,7 @@
         </p:blipFill>
         <p:spPr bwMode="auto">
           <a:xfrm>
-            <a:off x="906509" y="0"/>
+            <a:off x="800099" y="0"/>
             <a:ext cx="10599691" cy="6858000"/>
           </a:xfrm>
           <a:prstGeom prst="rect">
@@ -3304,68 +3651,22 @@
             <p:ph type="title"/>
           </p:nvPr>
         </p:nvSpPr>
-        <p:spPr>
-          <a:xfrm>
-            <a:off x="838200" y="250821"/>
-            <a:ext cx="10515600" cy="1325563"/>
-          </a:xfrm>
-        </p:spPr>
+        <p:spPr/>
         <p:txBody>
           <a:bodyPr/>
           <a:lstStyle/>
           <a:p>
             <a:r>
               <a:rPr lang="en-US" dirty="0" smtClean="0"/>
-              <a:t>File permissions </a:t>
+              <a:t>How to get around the system?</a:t>
             </a:r>
             <a:endParaRPr lang="en-US" dirty="0"/>
           </a:p>
         </p:txBody>
       </p:sp>
-      <p:pic>
-        <p:nvPicPr>
-          <p:cNvPr id="7170" name="Picture 2" descr="ttp://linux-blog.org/wp-content/uploads/2009/09/permissions.png"/>
-          <p:cNvPicPr>
-            <a:picLocks noChangeAspect="1" noChangeArrowheads="1"/>
-          </p:cNvPicPr>
-          <p:nvPr/>
-        </p:nvPicPr>
-        <p:blipFill>
-          <a:blip r:embed="rId2">
-            <a:extLst>
-              <a:ext uri="{28A0092B-C50C-407E-A947-70E740481C1C}">
-                <a14:useLocalDpi xmlns:a14="http://schemas.microsoft.com/office/drawing/2010/main" val="0"/>
-              </a:ext>
-            </a:extLst>
-          </a:blip>
-          <a:srcRect/>
-          <a:stretch>
-            <a:fillRect/>
-          </a:stretch>
-        </p:blipFill>
-        <p:spPr bwMode="auto">
-          <a:xfrm>
-            <a:off x="5144188" y="1300162"/>
-            <a:ext cx="7047812" cy="5557838"/>
-          </a:xfrm>
-          <a:prstGeom prst="rect">
-            <a:avLst/>
-          </a:prstGeom>
-          <a:noFill/>
-          <a:extLst>
-            <a:ext uri="{909E8E84-426E-40DD-AFC4-6F175D3DCCD1}">
-              <a14:hiddenFill xmlns:a14="http://schemas.microsoft.com/office/drawing/2010/main">
-                <a:solidFill>
-                  <a:srgbClr val="FFFFFF"/>
-                </a:solidFill>
-              </a14:hiddenFill>
-            </a:ext>
-          </a:extLst>
-        </p:spPr>
-      </p:pic>
-      <p:sp>
-        <p:nvSpPr>
-          <p:cNvPr id="5" name="Content Placeholder 2"/>
+      <p:sp>
+        <p:nvSpPr>
+          <p:cNvPr id="3" name="Content Placeholder 2"/>
           <p:cNvSpPr>
             <a:spLocks noGrp="1"/>
           </p:cNvSpPr>
@@ -3373,207 +3674,66 @@
             <p:ph idx="1"/>
           </p:nvPr>
         </p:nvSpPr>
-        <p:spPr>
-          <a:xfrm>
-            <a:off x="838200" y="1825625"/>
-            <a:ext cx="4133850" cy="4351338"/>
-          </a:xfrm>
-        </p:spPr>
-        <p:txBody>
-          <a:bodyPr>
-            <a:normAutofit lnSpcReduction="10000"/>
-          </a:bodyPr>
-          <a:lstStyle/>
-          <a:p>
-            <a:pPr marL="0" marR="0" lvl="0" indent="0" defTabSz="914400" eaLnBrk="1" fontAlgn="auto" latinLnBrk="0" hangingPunct="1">
-              <a:lnSpc>
-                <a:spcPct val="100000"/>
-              </a:lnSpc>
-              <a:spcBef>
-                <a:spcPts val="0"/>
-              </a:spcBef>
-              <a:spcAft>
-                <a:spcPts val="0"/>
-              </a:spcAft>
-              <a:buClrTx/>
-              <a:buSzTx/>
-              <a:buFontTx/>
-              <a:buNone/>
-              <a:tabLst/>
-              <a:defRPr/>
-            </a:pPr>
+        <p:spPr/>
+        <p:txBody>
+          <a:bodyPr/>
+          <a:lstStyle/>
+          <a:p>
+            <a:r>
+              <a:rPr lang="en-US" dirty="0" err="1" smtClean="0"/>
+              <a:t>pwd</a:t>
+            </a:r>
+            <a:endParaRPr lang="en-US" dirty="0" smtClean="0"/>
+          </a:p>
+          <a:p>
             <a:r>
               <a:rPr lang="en-US" dirty="0" smtClean="0"/>
-              <a:t>High level of access control!</a:t>
-            </a:r>
-          </a:p>
-          <a:p>
-            <a:pPr marL="0" marR="0" lvl="0" indent="0" defTabSz="914400" eaLnBrk="1" fontAlgn="auto" latinLnBrk="0" hangingPunct="1">
-              <a:lnSpc>
-                <a:spcPct val="100000"/>
-              </a:lnSpc>
-              <a:spcBef>
-                <a:spcPts val="0"/>
-              </a:spcBef>
-              <a:spcAft>
-                <a:spcPts val="0"/>
-              </a:spcAft>
-              <a:buClrTx/>
-              <a:buSzTx/>
-              <a:buFontTx/>
-              <a:buNone/>
-              <a:tabLst/>
-              <a:defRPr/>
-            </a:pPr>
+              <a:t>cd</a:t>
+            </a:r>
+          </a:p>
+          <a:p>
+            <a:r>
+              <a:rPr lang="en-US" dirty="0" smtClean="0"/>
+              <a:t>ls</a:t>
+            </a:r>
+          </a:p>
+          <a:p>
+            <a:r>
+              <a:rPr lang="en-US" dirty="0" err="1" smtClean="0"/>
+              <a:t>mkdir</a:t>
+            </a:r>
+            <a:r>
+              <a:rPr lang="en-US" smtClean="0"/>
+              <a:t> (-p)</a:t>
+            </a:r>
+            <a:endParaRPr lang="en-US" dirty="0" smtClean="0"/>
+          </a:p>
+          <a:p>
+            <a:r>
+              <a:rPr lang="en-US" dirty="0" err="1" smtClean="0"/>
+              <a:t>rm</a:t>
+            </a:r>
+            <a:endParaRPr lang="en-US" dirty="0" smtClean="0"/>
+          </a:p>
+          <a:p>
+            <a:r>
+              <a:rPr lang="en-US" dirty="0" smtClean="0"/>
+              <a:t>touch</a:t>
+            </a:r>
             <a:endParaRPr lang="en-US" dirty="0"/>
           </a:p>
           <a:p>
-            <a:pPr>
-              <a:lnSpc>
-                <a:spcPct val="100000"/>
-              </a:lnSpc>
-              <a:spcBef>
-                <a:spcPts val="0"/>
-              </a:spcBef>
-            </a:pPr>
-            <a:r>
-              <a:rPr lang="en-US" dirty="0" err="1" smtClean="0"/>
-              <a:t>chown</a:t>
-            </a:r>
-            <a:endParaRPr lang="en-US" dirty="0" smtClean="0"/>
-          </a:p>
-          <a:p>
-            <a:pPr>
-              <a:lnSpc>
-                <a:spcPct val="100000"/>
-              </a:lnSpc>
-              <a:spcBef>
-                <a:spcPts val="0"/>
-              </a:spcBef>
-            </a:pPr>
-            <a:r>
-              <a:rPr lang="en-US" dirty="0" err="1" smtClean="0"/>
-              <a:t>chmod</a:t>
-            </a:r>
-            <a:endParaRPr lang="en-US" dirty="0" smtClean="0"/>
-          </a:p>
-          <a:p>
-            <a:pPr>
-              <a:lnSpc>
-                <a:spcPct val="100000"/>
-              </a:lnSpc>
-              <a:spcBef>
-                <a:spcPts val="0"/>
-              </a:spcBef>
-            </a:pPr>
-            <a:endParaRPr lang="en-US" dirty="0"/>
-          </a:p>
-          <a:p>
-            <a:pPr>
-              <a:lnSpc>
-                <a:spcPct val="100000"/>
-              </a:lnSpc>
-              <a:spcBef>
-                <a:spcPts val="0"/>
-              </a:spcBef>
-            </a:pPr>
-            <a:r>
-              <a:rPr lang="mr-IN" b="1" dirty="0" err="1"/>
-              <a:t>r</a:t>
-            </a:r>
-            <a:r>
-              <a:rPr lang="mr-IN" b="1" dirty="0"/>
-              <a:t>=4 </a:t>
-            </a:r>
-            <a:r>
-              <a:rPr lang="mr-IN" b="1" dirty="0" err="1"/>
-              <a:t>w</a:t>
-            </a:r>
-            <a:r>
-              <a:rPr lang="mr-IN" b="1" dirty="0"/>
-              <a:t>=2 </a:t>
-            </a:r>
-            <a:r>
-              <a:rPr lang="mr-IN" b="1" dirty="0" err="1" smtClean="0"/>
-              <a:t>x</a:t>
-            </a:r>
-            <a:r>
-              <a:rPr lang="mr-IN" b="1" dirty="0" smtClean="0"/>
-              <a:t>=1</a:t>
-            </a:r>
-            <a:endParaRPr lang="en-US" b="1" dirty="0" smtClean="0"/>
-          </a:p>
-          <a:p>
-            <a:r>
-              <a:rPr lang="mr-IN" dirty="0" err="1"/>
-              <a:t>Owner</a:t>
-            </a:r>
-            <a:r>
-              <a:rPr lang="mr-IN" dirty="0"/>
-              <a:t>: </a:t>
-            </a:r>
-            <a:r>
-              <a:rPr lang="mr-IN" dirty="0" err="1"/>
-              <a:t>rwx</a:t>
-            </a:r>
-            <a:r>
-              <a:rPr lang="mr-IN" dirty="0"/>
-              <a:t>=4+2+1=7</a:t>
-            </a:r>
-          </a:p>
-          <a:p>
-            <a:r>
-              <a:rPr lang="mr-IN" dirty="0" err="1"/>
-              <a:t>Group</a:t>
-            </a:r>
-            <a:r>
-              <a:rPr lang="mr-IN" dirty="0"/>
-              <a:t>: </a:t>
-            </a:r>
-            <a:r>
-              <a:rPr lang="mr-IN" dirty="0" err="1"/>
-              <a:t>r-x</a:t>
-            </a:r>
-            <a:r>
-              <a:rPr lang="mr-IN" dirty="0"/>
-              <a:t>=4+0+1=5</a:t>
-            </a:r>
-          </a:p>
-          <a:p>
-            <a:r>
-              <a:rPr lang="mr-IN" dirty="0" err="1"/>
-              <a:t>Other</a:t>
-            </a:r>
-            <a:r>
-              <a:rPr lang="mr-IN" dirty="0"/>
-              <a:t>: </a:t>
-            </a:r>
-            <a:r>
-              <a:rPr lang="mr-IN" dirty="0" err="1"/>
-              <a:t>r-x</a:t>
-            </a:r>
-            <a:r>
-              <a:rPr lang="mr-IN" dirty="0"/>
-              <a:t>=4+0+1=5</a:t>
-            </a:r>
-          </a:p>
-          <a:p>
-            <a:pPr>
-              <a:lnSpc>
-                <a:spcPct val="100000"/>
-              </a:lnSpc>
-              <a:spcBef>
-                <a:spcPts val="0"/>
-              </a:spcBef>
-            </a:pPr>
-            <a:endParaRPr lang="en-US" dirty="0" smtClean="0"/>
+            <a:r>
+              <a:rPr lang="en-US" dirty="0" smtClean="0"/>
+              <a:t>man pages</a:t>
+            </a:r>
           </a:p>
         </p:txBody>
       </p:sp>
     </p:spTree>
     <p:extLst>
       <p:ext uri="{BB962C8B-B14F-4D97-AF65-F5344CB8AC3E}">
-        <p14:creationId xmlns:p14="http://schemas.microsoft.com/office/powerpoint/2010/main" val="872941264"/>
+        <p14:creationId xmlns:p14="http://schemas.microsoft.com/office/powerpoint/2010/main" val="1007915039"/>
       </p:ext>
     </p:extLst>
   </p:cSld>
@@ -3624,56 +3784,15 @@
           <a:p>
             <a:r>
               <a:rPr lang="en-US" dirty="0" smtClean="0"/>
-              <a:t>Regular versus super user</a:t>
+              <a:t>How to get around the system?</a:t>
             </a:r>
             <a:endParaRPr lang="en-US" dirty="0"/>
           </a:p>
         </p:txBody>
       </p:sp>
-      <p:pic>
-        <p:nvPicPr>
-          <p:cNvPr id="11266" name="Picture 2" descr="andwich"/>
-          <p:cNvPicPr>
-            <a:picLocks noChangeAspect="1" noChangeArrowheads="1"/>
-          </p:cNvPicPr>
-          <p:nvPr/>
-        </p:nvPicPr>
-        <p:blipFill>
-          <a:blip r:embed="rId2">
-            <a:extLst>
-              <a:ext uri="{28A0092B-C50C-407E-A947-70E740481C1C}">
-                <a14:useLocalDpi xmlns:a14="http://schemas.microsoft.com/office/drawing/2010/main" val="0"/>
-              </a:ext>
-            </a:extLst>
-          </a:blip>
-          <a:srcRect/>
-          <a:stretch>
-            <a:fillRect/>
-          </a:stretch>
-        </p:blipFill>
-        <p:spPr bwMode="auto">
-          <a:xfrm>
-            <a:off x="6096000" y="1976438"/>
-            <a:ext cx="4810921" cy="3995737"/>
-          </a:xfrm>
-          <a:prstGeom prst="rect">
-            <a:avLst/>
-          </a:prstGeom>
-          <a:noFill/>
-          <a:extLst>
-            <a:ext uri="{909E8E84-426E-40DD-AFC4-6F175D3DCCD1}">
-              <a14:hiddenFill xmlns:a14="http://schemas.microsoft.com/office/drawing/2010/main">
-                <a:solidFill>
-                  <a:srgbClr val="FFFFFF"/>
-                </a:solidFill>
-              </a14:hiddenFill>
-            </a:ext>
-          </a:extLst>
-        </p:spPr>
-      </p:pic>
-      <p:sp>
-        <p:nvSpPr>
-          <p:cNvPr id="5" name="Content Placeholder 2"/>
+      <p:sp>
+        <p:nvSpPr>
+          <p:cNvPr id="3" name="Content Placeholder 2"/>
           <p:cNvSpPr>
             <a:spLocks noGrp="1"/>
           </p:cNvSpPr>
@@ -3681,139 +3800,34 @@
             <p:ph idx="1"/>
           </p:nvPr>
         </p:nvSpPr>
-        <p:spPr>
-          <a:xfrm>
-            <a:off x="838200" y="1825625"/>
-            <a:ext cx="4133850" cy="4351338"/>
-          </a:xfrm>
-        </p:spPr>
-        <p:txBody>
-          <a:bodyPr>
-            <a:normAutofit/>
-          </a:bodyPr>
-          <a:lstStyle/>
-          <a:p>
-            <a:pPr>
-              <a:lnSpc>
-                <a:spcPct val="100000"/>
-              </a:lnSpc>
-              <a:spcBef>
-                <a:spcPts val="0"/>
-              </a:spcBef>
-            </a:pPr>
+        <p:spPr/>
+        <p:txBody>
+          <a:bodyPr/>
+          <a:lstStyle/>
+          <a:p>
             <a:r>
               <a:rPr lang="en-US" dirty="0" smtClean="0"/>
-              <a:t>Users have limited power</a:t>
-            </a:r>
-          </a:p>
-          <a:p>
-            <a:pPr marL="0" indent="0">
-              <a:lnSpc>
-                <a:spcPct val="100000"/>
-              </a:lnSpc>
-              <a:spcBef>
-                <a:spcPts val="0"/>
-              </a:spcBef>
-              <a:buNone/>
-            </a:pPr>
-            <a:r>
-              <a:rPr lang="en-US" dirty="0" smtClean="0">
-                <a:sym typeface="Wingdings"/>
-              </a:rPr>
-              <a:t> you cannot mess up the system; only your own files!</a:t>
-            </a:r>
-          </a:p>
-          <a:p>
-            <a:pPr>
-              <a:lnSpc>
-                <a:spcPct val="100000"/>
-              </a:lnSpc>
-              <a:spcBef>
-                <a:spcPts val="0"/>
-              </a:spcBef>
-            </a:pPr>
-            <a:endParaRPr lang="en-US" dirty="0" smtClean="0">
-              <a:sym typeface="Wingdings"/>
-            </a:endParaRPr>
-          </a:p>
-          <a:p>
-            <a:pPr>
-              <a:lnSpc>
-                <a:spcPct val="100000"/>
-              </a:lnSpc>
-              <a:spcBef>
-                <a:spcPts val="0"/>
-              </a:spcBef>
-            </a:pPr>
-            <a:r>
-              <a:rPr lang="en-US" dirty="0" smtClean="0">
-                <a:sym typeface="Wingdings"/>
-              </a:rPr>
-              <a:t>Sometimes you need more authority:</a:t>
-            </a:r>
-          </a:p>
-          <a:p>
-            <a:pPr marL="0" indent="0">
-              <a:lnSpc>
-                <a:spcPct val="100000"/>
-              </a:lnSpc>
-              <a:spcBef>
-                <a:spcPts val="0"/>
-              </a:spcBef>
-              <a:buNone/>
-            </a:pPr>
-            <a:r>
-              <a:rPr lang="en-US" dirty="0" smtClean="0">
-                <a:sym typeface="Wingdings"/>
-              </a:rPr>
-              <a:t> </a:t>
-            </a:r>
-            <a:r>
-              <a:rPr lang="en-US" dirty="0" err="1" smtClean="0">
-                <a:sym typeface="Wingdings"/>
-              </a:rPr>
-              <a:t>sudo</a:t>
-            </a:r>
-            <a:endParaRPr lang="en-US" dirty="0" smtClean="0">
-              <a:sym typeface="Wingdings"/>
-            </a:endParaRPr>
-          </a:p>
-          <a:p>
-            <a:pPr marL="0" indent="0">
-              <a:lnSpc>
-                <a:spcPct val="100000"/>
-              </a:lnSpc>
-              <a:spcBef>
-                <a:spcPts val="0"/>
-              </a:spcBef>
-              <a:buNone/>
-            </a:pPr>
-            <a:r>
-              <a:rPr lang="en-US" dirty="0" smtClean="0">
-                <a:sym typeface="Wingdings"/>
-              </a:rPr>
-              <a:t> </a:t>
-            </a:r>
-            <a:r>
-              <a:rPr lang="en-US" dirty="0" err="1" smtClean="0">
-                <a:sym typeface="Wingdings"/>
-              </a:rPr>
-              <a:t>su</a:t>
-            </a:r>
-            <a:r>
-              <a:rPr lang="en-US" dirty="0" smtClean="0">
-                <a:sym typeface="Wingdings"/>
-              </a:rPr>
-              <a:t> root</a:t>
-            </a:r>
-            <a:endParaRPr lang="en-US" dirty="0" smtClean="0"/>
+              <a:t>Absolute path: /home/user/directory</a:t>
+            </a:r>
+          </a:p>
+          <a:p>
+            <a:r>
+              <a:rPr lang="en-US" dirty="0" smtClean="0"/>
+              <a:t>Relative path: ./directory</a:t>
+            </a:r>
+          </a:p>
+          <a:p>
+            <a:r>
+              <a:rPr lang="en-US" dirty="0" smtClean="0"/>
+              <a:t>How about traversing down the directory tree? ../</a:t>
+            </a:r>
           </a:p>
         </p:txBody>
       </p:sp>
     </p:spTree>
     <p:extLst>
       <p:ext uri="{BB962C8B-B14F-4D97-AF65-F5344CB8AC3E}">
-        <p14:creationId xmlns:p14="http://schemas.microsoft.com/office/powerpoint/2010/main" val="1509904831"/>
+        <p14:creationId xmlns:p14="http://schemas.microsoft.com/office/powerpoint/2010/main" val="1036649747"/>
       </p:ext>
     </p:extLst>
   </p:cSld>
@@ -3864,7 +3878,7 @@
           <a:p>
             <a:r>
               <a:rPr lang="en-US" dirty="0" smtClean="0"/>
-              <a:t>How to get around the system?</a:t>
+              <a:t>No white spaces!</a:t>
             </a:r>
             <a:endParaRPr lang="en-US" dirty="0"/>
           </a:p>
@@ -3885,61 +3899,33 @@
           <a:bodyPr/>
           <a:lstStyle/>
           <a:p>
-            <a:r>
-              <a:rPr lang="en-US" dirty="0" err="1" smtClean="0"/>
-              <a:t>pwd</a:t>
-            </a:r>
-            <a:endParaRPr lang="en-US" dirty="0" smtClean="0"/>
-          </a:p>
-          <a:p>
+            <a:pPr marL="0" indent="0">
+              <a:buNone/>
+            </a:pPr>
             <a:r>
               <a:rPr lang="en-US" dirty="0" smtClean="0"/>
-              <a:t>cd</a:t>
+              <a:t>How do we deal with spaces in file names?</a:t>
             </a:r>
           </a:p>
           <a:p>
             <a:r>
               <a:rPr lang="en-US" dirty="0" smtClean="0"/>
-              <a:t>ls</a:t>
-            </a:r>
-          </a:p>
-          <a:p>
-            <a:r>
-              <a:rPr lang="en-US" dirty="0" err="1" smtClean="0"/>
-              <a:t>mkdir</a:t>
-            </a:r>
-            <a:r>
-              <a:rPr lang="en-US" smtClean="0"/>
-              <a:t> (-p)</a:t>
-            </a:r>
-            <a:endParaRPr lang="en-US" dirty="0" smtClean="0"/>
-          </a:p>
-          <a:p>
-            <a:r>
-              <a:rPr lang="en-US" dirty="0" err="1" smtClean="0"/>
-              <a:t>rm</a:t>
-            </a:r>
-            <a:endParaRPr lang="en-US" dirty="0" smtClean="0"/>
+              <a:t>Escape them with \</a:t>
+            </a:r>
           </a:p>
           <a:p>
             <a:r>
               <a:rPr lang="en-US" dirty="0" smtClean="0"/>
-              <a:t>touch</a:t>
+              <a:t>We will come back to quotes later</a:t>
             </a:r>
             <a:endParaRPr lang="en-US" dirty="0"/>
-          </a:p>
-          <a:p>
-            <a:r>
-              <a:rPr lang="en-US" dirty="0" smtClean="0"/>
-              <a:t>man pages</a:t>
-            </a:r>
           </a:p>
         </p:txBody>
       </p:sp>
     </p:spTree>
     <p:extLst>
       <p:ext uri="{BB962C8B-B14F-4D97-AF65-F5344CB8AC3E}">
-        <p14:creationId xmlns:p14="http://schemas.microsoft.com/office/powerpoint/2010/main" val="1007915039"/>
+        <p14:creationId xmlns:p14="http://schemas.microsoft.com/office/powerpoint/2010/main" val="1385678918"/>
       </p:ext>
     </p:extLst>
   </p:cSld>
@@ -3983,14 +3969,19 @@
             <p:ph type="title"/>
           </p:nvPr>
         </p:nvSpPr>
-        <p:spPr/>
+        <p:spPr>
+          <a:xfrm>
+            <a:off x="838200" y="250821"/>
+            <a:ext cx="10515600" cy="1325563"/>
+          </a:xfrm>
+        </p:spPr>
         <p:txBody>
           <a:bodyPr/>
           <a:lstStyle/>
           <a:p>
             <a:r>
               <a:rPr lang="en-US" dirty="0" smtClean="0"/>
-              <a:t>No white spaces!</a:t>
+              <a:t>File permissions </a:t>
             </a:r>
             <a:endParaRPr lang="en-US" dirty="0"/>
           </a:p>
@@ -3998,7 +3989,7 @@
       </p:sp>
       <p:sp>
         <p:nvSpPr>
-          <p:cNvPr id="3" name="Content Placeholder 2"/>
+          <p:cNvPr id="5" name="Content Placeholder 2"/>
           <p:cNvSpPr>
             <a:spLocks noGrp="1"/>
           </p:cNvSpPr>
@@ -4006,38 +3997,248 @@
             <p:ph idx="1"/>
           </p:nvPr>
         </p:nvSpPr>
-        <p:spPr/>
-        <p:txBody>
-          <a:bodyPr/>
-          <a:lstStyle/>
-          <a:p>
-            <a:pPr marL="0" indent="0">
-              <a:buNone/>
+        <p:spPr>
+          <a:xfrm>
+            <a:off x="838200" y="1825625"/>
+            <a:ext cx="4133850" cy="4351338"/>
+          </a:xfrm>
+        </p:spPr>
+        <p:txBody>
+          <a:bodyPr>
+            <a:normAutofit lnSpcReduction="10000"/>
+          </a:bodyPr>
+          <a:lstStyle/>
+          <a:p>
+            <a:pPr marL="0" marR="0" lvl="0" indent="0" defTabSz="914400" eaLnBrk="1" fontAlgn="auto" latinLnBrk="0" hangingPunct="1">
+              <a:lnSpc>
+                <a:spcPct val="100000"/>
+              </a:lnSpc>
+              <a:spcBef>
+                <a:spcPts val="0"/>
+              </a:spcBef>
+              <a:spcAft>
+                <a:spcPts val="0"/>
+              </a:spcAft>
+              <a:buClrTx/>
+              <a:buSzTx/>
+              <a:buFontTx/>
+              <a:buNone/>
+              <a:tabLst/>
+              <a:defRPr/>
             </a:pPr>
             <a:r>
               <a:rPr lang="en-US" dirty="0" smtClean="0"/>
-              <a:t>How do we deal with spaces in file names?</a:t>
-            </a:r>
-          </a:p>
-          <a:p>
-            <a:r>
-              <a:rPr lang="en-US" dirty="0" smtClean="0"/>
-              <a:t>Escape them with \</a:t>
-            </a:r>
-          </a:p>
-          <a:p>
-            <a:r>
-              <a:rPr lang="en-US" dirty="0" smtClean="0"/>
-              <a:t>We will come back to quotes later</a:t>
-            </a:r>
+              <a:t>High level of access control!</a:t>
+            </a:r>
+          </a:p>
+          <a:p>
+            <a:pPr marL="0" marR="0" lvl="0" indent="0" defTabSz="914400" eaLnBrk="1" fontAlgn="auto" latinLnBrk="0" hangingPunct="1">
+              <a:lnSpc>
+                <a:spcPct val="100000"/>
+              </a:lnSpc>
+              <a:spcBef>
+                <a:spcPts val="0"/>
+              </a:spcBef>
+              <a:spcAft>
+                <a:spcPts val="0"/>
+              </a:spcAft>
+              <a:buClrTx/>
+              <a:buSzTx/>
+              <a:buFontTx/>
+              <a:buNone/>
+              <a:tabLst/>
+              <a:defRPr/>
+            </a:pPr>
             <a:endParaRPr lang="en-US" dirty="0"/>
           </a:p>
-        </p:txBody>
-      </p:sp>
+          <a:p>
+            <a:pPr>
+              <a:lnSpc>
+                <a:spcPct val="100000"/>
+              </a:lnSpc>
+              <a:spcBef>
+                <a:spcPts val="0"/>
+              </a:spcBef>
+            </a:pPr>
+            <a:r>
+              <a:rPr lang="en-US" dirty="0" err="1" smtClean="0"/>
+              <a:t>chown</a:t>
+            </a:r>
+            <a:endParaRPr lang="en-US" dirty="0" smtClean="0"/>
+          </a:p>
+          <a:p>
+            <a:pPr>
+              <a:lnSpc>
+                <a:spcPct val="100000"/>
+              </a:lnSpc>
+              <a:spcBef>
+                <a:spcPts val="0"/>
+              </a:spcBef>
+            </a:pPr>
+            <a:r>
+              <a:rPr lang="en-US" dirty="0" err="1" smtClean="0"/>
+              <a:t>chmod</a:t>
+            </a:r>
+            <a:endParaRPr lang="en-US" dirty="0" smtClean="0"/>
+          </a:p>
+          <a:p>
+            <a:pPr>
+              <a:lnSpc>
+                <a:spcPct val="100000"/>
+              </a:lnSpc>
+              <a:spcBef>
+                <a:spcPts val="0"/>
+              </a:spcBef>
+            </a:pPr>
+            <a:endParaRPr lang="en-US" dirty="0"/>
+          </a:p>
+          <a:p>
+            <a:pPr>
+              <a:lnSpc>
+                <a:spcPct val="100000"/>
+              </a:lnSpc>
+              <a:spcBef>
+                <a:spcPts val="0"/>
+              </a:spcBef>
+            </a:pPr>
+            <a:r>
+              <a:rPr lang="mr-IN" b="1" dirty="0" err="1"/>
+              <a:t>r</a:t>
+            </a:r>
+            <a:r>
+              <a:rPr lang="mr-IN" b="1" dirty="0"/>
+              <a:t>=4 </a:t>
+            </a:r>
+            <a:r>
+              <a:rPr lang="mr-IN" b="1" dirty="0" err="1"/>
+              <a:t>w</a:t>
+            </a:r>
+            <a:r>
+              <a:rPr lang="mr-IN" b="1" dirty="0"/>
+              <a:t>=2 </a:t>
+            </a:r>
+            <a:r>
+              <a:rPr lang="mr-IN" b="1" dirty="0" err="1" smtClean="0"/>
+              <a:t>x</a:t>
+            </a:r>
+            <a:r>
+              <a:rPr lang="mr-IN" b="1" dirty="0" smtClean="0"/>
+              <a:t>=1</a:t>
+            </a:r>
+            <a:endParaRPr lang="en-US" b="1" dirty="0" smtClean="0"/>
+          </a:p>
+          <a:p>
+            <a:r>
+              <a:rPr lang="mr-IN" dirty="0" err="1"/>
+              <a:t>Owner</a:t>
+            </a:r>
+            <a:r>
+              <a:rPr lang="mr-IN" dirty="0"/>
+              <a:t>: </a:t>
+            </a:r>
+            <a:r>
+              <a:rPr lang="mr-IN" dirty="0" err="1"/>
+              <a:t>rwx</a:t>
+            </a:r>
+            <a:r>
+              <a:rPr lang="mr-IN" dirty="0"/>
+              <a:t>=4+2+1=7</a:t>
+            </a:r>
+          </a:p>
+          <a:p>
+            <a:r>
+              <a:rPr lang="mr-IN" dirty="0" err="1"/>
+              <a:t>Group</a:t>
+            </a:r>
+            <a:r>
+              <a:rPr lang="mr-IN" dirty="0"/>
+              <a:t>: </a:t>
+            </a:r>
+            <a:r>
+              <a:rPr lang="mr-IN" dirty="0" err="1"/>
+              <a:t>r-x</a:t>
+            </a:r>
+            <a:r>
+              <a:rPr lang="mr-IN" dirty="0"/>
+              <a:t>=4+0+1=5</a:t>
+            </a:r>
+          </a:p>
+          <a:p>
+            <a:r>
+              <a:rPr lang="mr-IN" dirty="0" err="1"/>
+              <a:t>Other</a:t>
+            </a:r>
+            <a:r>
+              <a:rPr lang="mr-IN" dirty="0"/>
+              <a:t>: </a:t>
+            </a:r>
+            <a:r>
+              <a:rPr lang="mr-IN" dirty="0" err="1"/>
+              <a:t>r-x</a:t>
+            </a:r>
+            <a:r>
+              <a:rPr lang="mr-IN" dirty="0"/>
+              <a:t>=4+0+1=5</a:t>
+            </a:r>
+          </a:p>
+          <a:p>
+            <a:pPr>
+              <a:lnSpc>
+                <a:spcPct val="100000"/>
+              </a:lnSpc>
+              <a:spcBef>
+                <a:spcPts val="0"/>
+              </a:spcBef>
+            </a:pPr>
+            <a:endParaRPr lang="en-US" dirty="0" smtClean="0"/>
+          </a:p>
+        </p:txBody>
+      </p:sp>
+      <p:pic>
+        <p:nvPicPr>
+          <p:cNvPr id="3" name="Picture 2" descr="ttp://linux-blog.org/wp-content/uploads/2009/09/permissions.png"/>
+          <p:cNvPicPr>
+            <a:picLocks noChangeAspect="1" noChangeArrowheads="1"/>
+          </p:cNvPicPr>
+          <p:nvPr/>
+        </p:nvPicPr>
+        <p:blipFill>
+          <a:blip r:embed="rId2">
+            <a:extLst>
+              <a:ext uri="{28A0092B-C50C-407E-A947-70E740481C1C}">
+                <a14:useLocalDpi xmlns:a14="http://schemas.microsoft.com/office/drawing/2010/main" val="0"/>
+              </a:ext>
+            </a:extLst>
+          </a:blip>
+          <a:srcRect/>
+          <a:stretch>
+            <a:fillRect/>
+          </a:stretch>
+        </p:blipFill>
+        <p:spPr bwMode="auto">
+          <a:xfrm>
+            <a:off x="4999246" y="1165225"/>
+            <a:ext cx="7192754" cy="5672138"/>
+          </a:xfrm>
+          <a:prstGeom prst="rect">
+            <a:avLst/>
+          </a:prstGeom>
+          <a:noFill/>
+          <a:extLst>
+            <a:ext uri="{909E8E84-426E-40DD-AFC4-6F175D3DCCD1}">
+              <a14:hiddenFill xmlns:a14="http://schemas.microsoft.com/office/drawing/2010/main">
+                <a:solidFill>
+                  <a:srgbClr val="FFFFFF"/>
+                </a:solidFill>
+              </a14:hiddenFill>
+            </a:ext>
+          </a:extLst>
+        </p:spPr>
+      </p:pic>
     </p:spTree>
     <p:extLst>
       <p:ext uri="{BB962C8B-B14F-4D97-AF65-F5344CB8AC3E}">
-        <p14:creationId xmlns:p14="http://schemas.microsoft.com/office/powerpoint/2010/main" val="1385678918"/>
+        <p14:creationId xmlns:p14="http://schemas.microsoft.com/office/powerpoint/2010/main" val="872941264"/>
       </p:ext>
     </p:extLst>
   </p:cSld>
@@ -4088,7 +4289,7 @@
           <a:p>
             <a:r>
               <a:rPr lang="en-US" dirty="0" smtClean="0"/>
-              <a:t>Package manager</a:t>
+              <a:t>Regular versus super user</a:t>
             </a:r>
             <a:endParaRPr lang="en-US" dirty="0"/>
           </a:p>
@@ -4096,7 +4297,7 @@
       </p:sp>
       <p:sp>
         <p:nvSpPr>
-          <p:cNvPr id="3" name="Content Placeholder 2"/>
+          <p:cNvPr id="5" name="Content Placeholder 2"/>
           <p:cNvSpPr>
             <a:spLocks noGrp="1"/>
           </p:cNvSpPr>
@@ -4104,61 +4305,193 @@
             <p:ph idx="1"/>
           </p:nvPr>
         </p:nvSpPr>
-        <p:spPr/>
-        <p:txBody>
-          <a:bodyPr/>
-          <a:lstStyle/>
-          <a:p>
+        <p:spPr>
+          <a:xfrm>
+            <a:off x="838200" y="1825625"/>
+            <a:ext cx="4133850" cy="4351338"/>
+          </a:xfrm>
+        </p:spPr>
+        <p:txBody>
+          <a:bodyPr>
+            <a:normAutofit/>
+          </a:bodyPr>
+          <a:lstStyle/>
+          <a:p>
+            <a:pPr>
+              <a:lnSpc>
+                <a:spcPct val="100000"/>
+              </a:lnSpc>
+              <a:spcBef>
+                <a:spcPts val="0"/>
+              </a:spcBef>
+            </a:pPr>
             <a:r>
               <a:rPr lang="en-US" dirty="0" smtClean="0"/>
-              <a:t>Package managers (keep track of dependencies)</a:t>
-            </a:r>
-          </a:p>
-          <a:p>
-            <a:r>
-              <a:rPr lang="en-US" dirty="0" smtClean="0"/>
-              <a:t>apt-get update</a:t>
-            </a:r>
-          </a:p>
-          <a:p>
-            <a:r>
-              <a:rPr lang="en-US" dirty="0" smtClean="0"/>
-              <a:t>apt-get upgrade</a:t>
-            </a:r>
-          </a:p>
-          <a:p>
-            <a:r>
-              <a:rPr lang="en-US" dirty="0" smtClean="0"/>
-              <a:t>apt-cache search</a:t>
-            </a:r>
-          </a:p>
-          <a:p>
-            <a:r>
-              <a:rPr lang="en-US" dirty="0"/>
-              <a:t>i</a:t>
-            </a:r>
-            <a:r>
-              <a:rPr lang="en-US" dirty="0" smtClean="0"/>
-              <a:t>nstall </a:t>
-            </a:r>
-            <a:r>
-              <a:rPr lang="en-US" dirty="0" err="1" smtClean="0"/>
-              <a:t>seaview</a:t>
-            </a:r>
-            <a:endParaRPr lang="en-US" dirty="0"/>
-          </a:p>
-        </p:txBody>
-      </p:sp>
+              <a:t>Users have limited power</a:t>
+            </a:r>
+          </a:p>
+          <a:p>
+            <a:pPr marL="0" indent="0">
+              <a:lnSpc>
+                <a:spcPct val="100000"/>
+              </a:lnSpc>
+              <a:spcBef>
+                <a:spcPts val="0"/>
+              </a:spcBef>
+              <a:buNone/>
+            </a:pPr>
+            <a:r>
+              <a:rPr lang="en-US" dirty="0" smtClean="0">
+                <a:sym typeface="Wingdings"/>
+              </a:rPr>
+              <a:t> you cannot mess up the system; only your own files!</a:t>
+            </a:r>
+          </a:p>
+          <a:p>
+            <a:pPr>
+              <a:lnSpc>
+                <a:spcPct val="100000"/>
+              </a:lnSpc>
+              <a:spcBef>
+                <a:spcPts val="0"/>
+              </a:spcBef>
+            </a:pPr>
+            <a:endParaRPr lang="en-US" dirty="0" smtClean="0">
+              <a:sym typeface="Wingdings"/>
+            </a:endParaRPr>
+          </a:p>
+          <a:p>
+            <a:pPr>
+              <a:lnSpc>
+                <a:spcPct val="100000"/>
+              </a:lnSpc>
+              <a:spcBef>
+                <a:spcPts val="0"/>
+              </a:spcBef>
+            </a:pPr>
+            <a:r>
+              <a:rPr lang="en-US" dirty="0" smtClean="0">
+                <a:sym typeface="Wingdings"/>
+              </a:rPr>
+              <a:t>Sometimes you need more authority:</a:t>
+            </a:r>
+          </a:p>
+          <a:p>
+            <a:pPr marL="0" indent="0">
+              <a:lnSpc>
+                <a:spcPct val="100000"/>
+              </a:lnSpc>
+              <a:spcBef>
+                <a:spcPts val="0"/>
+              </a:spcBef>
+              <a:buNone/>
+            </a:pPr>
+            <a:r>
+              <a:rPr lang="en-US" dirty="0" smtClean="0">
+                <a:sym typeface="Wingdings"/>
+              </a:rPr>
+              <a:t> </a:t>
+            </a:r>
+            <a:r>
+              <a:rPr lang="en-US" dirty="0" err="1" smtClean="0">
+                <a:sym typeface="Wingdings"/>
+              </a:rPr>
+              <a:t>sudo</a:t>
+            </a:r>
+            <a:endParaRPr lang="en-US" dirty="0" smtClean="0">
+              <a:sym typeface="Wingdings"/>
+            </a:endParaRPr>
+          </a:p>
+          <a:p>
+            <a:pPr marL="0" indent="0">
+              <a:lnSpc>
+                <a:spcPct val="100000"/>
+              </a:lnSpc>
+              <a:spcBef>
+                <a:spcPts val="0"/>
+              </a:spcBef>
+              <a:buNone/>
+            </a:pPr>
+            <a:r>
+              <a:rPr lang="en-US" dirty="0" smtClean="0">
+                <a:sym typeface="Wingdings"/>
+              </a:rPr>
+              <a:t> </a:t>
+            </a:r>
+            <a:r>
+              <a:rPr lang="en-US" dirty="0" err="1" smtClean="0">
+                <a:sym typeface="Wingdings"/>
+              </a:rPr>
+              <a:t>su</a:t>
+            </a:r>
+            <a:r>
+              <a:rPr lang="en-US" dirty="0" smtClean="0">
+                <a:sym typeface="Wingdings"/>
+              </a:rPr>
+              <a:t> root</a:t>
+            </a:r>
+            <a:endParaRPr lang="en-US" dirty="0" smtClean="0"/>
+          </a:p>
+        </p:txBody>
+      </p:sp>
+      <p:pic>
+        <p:nvPicPr>
+          <p:cNvPr id="8194" name="Picture 2" descr="ttps://imgs.xkcd.com/comics/sandwich.png"/>
+          <p:cNvPicPr>
+            <a:picLocks noChangeAspect="1" noChangeArrowheads="1"/>
+          </p:cNvPicPr>
+          <p:nvPr/>
+        </p:nvPicPr>
+        <p:blipFill>
+          <a:blip r:embed="rId2">
+            <a:extLst>
+              <a:ext uri="{28A0092B-C50C-407E-A947-70E740481C1C}">
+                <a14:useLocalDpi xmlns:a14="http://schemas.microsoft.com/office/drawing/2010/main" val="0"/>
+              </a:ext>
+            </a:extLst>
+          </a:blip>
+          <a:srcRect/>
+          <a:stretch>
+            <a:fillRect/>
+          </a:stretch>
+        </p:blipFill>
+        <p:spPr bwMode="auto">
+          <a:xfrm>
+            <a:off x="6129337" y="1825625"/>
+            <a:ext cx="5044109" cy="4189413"/>
+          </a:xfrm>
+          <a:prstGeom prst="rect">
+            <a:avLst/>
+          </a:prstGeom>
+          <a:noFill/>
+          <a:extLst>
+            <a:ext uri="{909E8E84-426E-40DD-AFC4-6F175D3DCCD1}">
+              <a14:hiddenFill xmlns:a14="http://schemas.microsoft.com/office/drawing/2010/main">
+                <a:solidFill>
+                  <a:srgbClr val="FFFFFF"/>
+                </a:solidFill>
+              </a14:hiddenFill>
+            </a:ext>
+          </a:extLst>
+        </p:spPr>
+      </p:pic>
     </p:spTree>
     <p:extLst>
       <p:ext uri="{BB962C8B-B14F-4D97-AF65-F5344CB8AC3E}">
-        <p14:creationId xmlns:p14="http://schemas.microsoft.com/office/powerpoint/2010/main" val="1868917341"/>
+        <p14:creationId xmlns:p14="http://schemas.microsoft.com/office/powerpoint/2010/main" val="1509904831"/>
       </p:ext>
     </p:extLst>
   </p:cSld>
   <p:clrMapOvr>
     <a:masterClrMapping/>
   </p:clrMapOvr>
+  <p:timing>
+    <p:tnLst>
+      <p:par>
+        <p:cTn id="1" dur="indefinite" restart="never" nodeType="tmRoot"/>
+      </p:par>
+    </p:tnLst>
+  </p:timing>
 </p:sld>
 </file>
 
@@ -4196,7 +4529,7 @@
           <a:p>
             <a:r>
               <a:rPr lang="en-US" dirty="0" smtClean="0"/>
-              <a:t>Text editors</a:t>
+              <a:t>Package manager</a:t>
             </a:r>
             <a:endParaRPr lang="en-US" dirty="0"/>
           </a:p>
@@ -4219,100 +4552,39 @@
           <a:p>
             <a:r>
               <a:rPr lang="en-US" dirty="0" smtClean="0"/>
-              <a:t>less </a:t>
-            </a:r>
-            <a:r>
-              <a:rPr lang="mr-IN" dirty="0" smtClean="0"/>
-              <a:t>–</a:t>
-            </a:r>
+              <a:t>Package managers (keep track of dependencies)</a:t>
+            </a:r>
+          </a:p>
+          <a:p>
             <a:r>
               <a:rPr lang="en-US" dirty="0" smtClean="0"/>
-              <a:t> text viewer</a:t>
-            </a:r>
-          </a:p>
-          <a:p>
+              <a:t>apt-get update</a:t>
+            </a:r>
+          </a:p>
+          <a:p>
+            <a:r>
+              <a:rPr lang="en-US" dirty="0" smtClean="0"/>
+              <a:t>apt-get upgrade</a:t>
+            </a:r>
+          </a:p>
+          <a:p>
+            <a:r>
+              <a:rPr lang="en-US" dirty="0" smtClean="0"/>
+              <a:t>apt-cache search</a:t>
+            </a:r>
+          </a:p>
+          <a:p>
+            <a:r>
+              <a:rPr lang="en-US" dirty="0"/>
+              <a:t>i</a:t>
+            </a:r>
+            <a:r>
+              <a:rPr lang="en-US" dirty="0" smtClean="0"/>
+              <a:t>nstall </a:t>
+            </a:r>
             <a:r>
               <a:rPr lang="en-US" dirty="0" err="1" smtClean="0"/>
-              <a:t>nano</a:t>
-            </a:r>
-            <a:r>
-              <a:rPr lang="en-US" dirty="0" smtClean="0"/>
-              <a:t> </a:t>
-            </a:r>
-            <a:r>
-              <a:rPr lang="mr-IN" dirty="0" smtClean="0"/>
-              <a:t>–</a:t>
-            </a:r>
-            <a:r>
-              <a:rPr lang="en-US" dirty="0" smtClean="0"/>
-              <a:t> intuitive and easy but limited</a:t>
-            </a:r>
-          </a:p>
-          <a:p>
-            <a:r>
-              <a:rPr lang="en-US" dirty="0" smtClean="0"/>
-              <a:t>vi(m) </a:t>
-            </a:r>
-            <a:r>
-              <a:rPr lang="mr-IN" dirty="0" smtClean="0"/>
-              <a:t>–</a:t>
-            </a:r>
-            <a:r>
-              <a:rPr lang="en-US" dirty="0" smtClean="0"/>
-              <a:t> available everywhere and powerful</a:t>
-            </a:r>
-          </a:p>
-          <a:p>
-            <a:r>
-              <a:rPr lang="en-US" dirty="0" err="1" smtClean="0"/>
-              <a:t>emacs</a:t>
-            </a:r>
-            <a:r>
-              <a:rPr lang="en-US" dirty="0" smtClean="0"/>
-              <a:t> </a:t>
-            </a:r>
-            <a:r>
-              <a:rPr lang="mr-IN" dirty="0" smtClean="0"/>
-              <a:t>–</a:t>
-            </a:r>
-            <a:r>
-              <a:rPr lang="en-US" dirty="0" smtClean="0"/>
-              <a:t> </a:t>
-            </a:r>
-            <a:r>
-              <a:rPr lang="en-US" dirty="0" err="1" smtClean="0"/>
-              <a:t>powerfull</a:t>
-            </a:r>
-            <a:r>
-              <a:rPr lang="en-US" dirty="0" smtClean="0"/>
-              <a:t> but too bloated for my taste</a:t>
-            </a:r>
-            <a:endParaRPr lang="en-US" dirty="0"/>
-          </a:p>
-          <a:p>
-            <a:r>
-              <a:rPr lang="en-US" dirty="0" err="1" smtClean="0"/>
-              <a:t>geany</a:t>
-            </a:r>
-            <a:r>
-              <a:rPr lang="en-US" dirty="0" smtClean="0"/>
-              <a:t> </a:t>
-            </a:r>
-            <a:r>
-              <a:rPr lang="mr-IN" dirty="0" smtClean="0"/>
-              <a:t>–</a:t>
-            </a:r>
-            <a:r>
-              <a:rPr lang="en-US" dirty="0" smtClean="0"/>
-              <a:t> </a:t>
-            </a:r>
-            <a:r>
-              <a:rPr lang="en-US" dirty="0" err="1" smtClean="0"/>
-              <a:t>ligt</a:t>
-            </a:r>
-            <a:r>
-              <a:rPr lang="en-US" dirty="0" smtClean="0"/>
-              <a:t> weight IDE</a:t>
+              <a:t>seaview</a:t>
             </a:r>
             <a:endParaRPr lang="en-US" dirty="0"/>
           </a:p>
@@ -4321,13 +4593,20 @@
     </p:spTree>
     <p:extLst>
       <p:ext uri="{BB962C8B-B14F-4D97-AF65-F5344CB8AC3E}">
-        <p14:creationId xmlns:p14="http://schemas.microsoft.com/office/powerpoint/2010/main" val="1068455104"/>
+        <p14:creationId xmlns:p14="http://schemas.microsoft.com/office/powerpoint/2010/main" val="1868917341"/>
       </p:ext>
     </p:extLst>
   </p:cSld>
   <p:clrMapOvr>
     <a:masterClrMapping/>
   </p:clrMapOvr>
+  <p:timing>
+    <p:tnLst>
+      <p:par>
+        <p:cTn id="1" dur="indefinite" restart="never" nodeType="tmRoot"/>
+      </p:par>
+    </p:tnLst>
+  </p:timing>
 </p:sld>
 </file>
 
@@ -4365,11 +4644,69 @@
           <a:p>
             <a:r>
               <a:rPr lang="en-US" dirty="0" smtClean="0"/>
-              <a:t>grep, </a:t>
+              <a:t>System monitoring tools</a:t>
+            </a:r>
+            <a:endParaRPr lang="en-US" dirty="0"/>
+          </a:p>
+        </p:txBody>
+      </p:sp>
+      <p:sp>
+        <p:nvSpPr>
+          <p:cNvPr id="3" name="Content Placeholder 2"/>
+          <p:cNvSpPr>
+            <a:spLocks noGrp="1"/>
+          </p:cNvSpPr>
+          <p:nvPr>
+            <p:ph idx="1"/>
+          </p:nvPr>
+        </p:nvSpPr>
+        <p:spPr/>
+        <p:txBody>
+          <a:bodyPr/>
+          <a:lstStyle/>
+          <a:p>
+            <a:r>
+              <a:rPr lang="en-US" dirty="0" smtClean="0"/>
+              <a:t>Install </a:t>
             </a:r>
             <a:r>
               <a:rPr lang="en-US" dirty="0" err="1" smtClean="0"/>
-              <a:t>sed</a:t>
+              <a:t>htop</a:t>
+            </a:r>
+            <a:endParaRPr lang="en-US" dirty="0" smtClean="0"/>
+          </a:p>
+          <a:p>
+            <a:r>
+              <a:rPr lang="en-US" dirty="0" smtClean="0"/>
+              <a:t>Memory and CPU usage</a:t>
+            </a:r>
+          </a:p>
+          <a:p>
+            <a:r>
+              <a:rPr lang="en-US" dirty="0" smtClean="0"/>
+              <a:t>What is SWAP?</a:t>
+            </a:r>
+          </a:p>
+          <a:p>
+            <a:r>
+              <a:rPr lang="en-US" dirty="0" err="1" smtClean="0"/>
+              <a:t>Killining</a:t>
+            </a:r>
+            <a:r>
+              <a:rPr lang="en-US" dirty="0" smtClean="0"/>
+              <a:t> process </a:t>
+            </a:r>
+            <a:r>
+              <a:rPr lang="mr-IN" dirty="0" smtClean="0"/>
+              <a:t>–</a:t>
+            </a:r>
+            <a:r>
+              <a:rPr lang="en-US" dirty="0" smtClean="0"/>
+              <a:t> ctrl-c, </a:t>
+            </a:r>
+            <a:r>
+              <a:rPr lang="en-US" dirty="0" err="1" smtClean="0"/>
+              <a:t>ps</a:t>
             </a:r>
             <a:r>
               <a:rPr lang="en-US" dirty="0" smtClean="0"/>
@@ -4377,101 +4714,16 @@
             </a:r>
             <a:r>
               <a:rPr lang="en-US" dirty="0" err="1" smtClean="0"/>
-              <a:t>awk</a:t>
+              <a:t>htop</a:t>
             </a:r>
             <a:endParaRPr lang="en-US" dirty="0"/>
-          </a:p>
-        </p:txBody>
-      </p:sp>
-      <p:sp>
-        <p:nvSpPr>
-          <p:cNvPr id="3" name="Content Placeholder 2"/>
-          <p:cNvSpPr>
-            <a:spLocks noGrp="1"/>
-          </p:cNvSpPr>
-          <p:nvPr>
-            <p:ph idx="1"/>
-          </p:nvPr>
-        </p:nvSpPr>
-        <p:spPr/>
-        <p:txBody>
-          <a:bodyPr/>
-          <a:lstStyle/>
-          <a:p>
-            <a:r>
-              <a:rPr lang="en-US" dirty="0" smtClean="0"/>
-              <a:t>grep </a:t>
-            </a:r>
-            <a:r>
-              <a:rPr lang="mr-IN" dirty="0" smtClean="0"/>
-              <a:t>–</a:t>
-            </a:r>
-            <a:r>
-              <a:rPr lang="en-US" dirty="0" smtClean="0"/>
-              <a:t> powerful pattern searches, including regex</a:t>
-            </a:r>
-          </a:p>
-          <a:p>
-            <a:r>
-              <a:rPr lang="en-US" dirty="0" err="1"/>
-              <a:t>s</a:t>
-            </a:r>
-            <a:r>
-              <a:rPr lang="en-US" dirty="0" err="1" smtClean="0"/>
-              <a:t>ed</a:t>
-            </a:r>
-            <a:r>
-              <a:rPr lang="en-US" dirty="0" smtClean="0"/>
-              <a:t> </a:t>
-            </a:r>
-            <a:r>
-              <a:rPr lang="mr-IN" dirty="0" smtClean="0"/>
-              <a:t>–</a:t>
-            </a:r>
-            <a:r>
-              <a:rPr lang="en-US" dirty="0" smtClean="0"/>
-              <a:t> stream editor, search and replace (</a:t>
-            </a:r>
-            <a:r>
-              <a:rPr lang="en-US" dirty="0" err="1" smtClean="0"/>
-              <a:t>perl</a:t>
-            </a:r>
-            <a:r>
-              <a:rPr lang="mr-IN" dirty="0" smtClean="0"/>
-              <a:t>…</a:t>
-            </a:r>
-            <a:r>
-              <a:rPr lang="en-US" dirty="0" smtClean="0"/>
-              <a:t>)</a:t>
-            </a:r>
-          </a:p>
-          <a:p>
-            <a:r>
-              <a:rPr lang="en-US" dirty="0" err="1" smtClean="0"/>
-              <a:t>awk</a:t>
-            </a:r>
-            <a:r>
-              <a:rPr lang="en-US" dirty="0" smtClean="0"/>
-              <a:t> </a:t>
-            </a:r>
-            <a:r>
-              <a:rPr lang="mr-IN" dirty="0" smtClean="0"/>
-              <a:t>–</a:t>
-            </a:r>
-            <a:r>
-              <a:rPr lang="en-US" dirty="0" smtClean="0"/>
-              <a:t> scanning and processing programming language</a:t>
-            </a:r>
-          </a:p>
-          <a:p>
-            <a:endParaRPr lang="en-US" dirty="0" smtClean="0"/>
           </a:p>
         </p:txBody>
       </p:sp>
     </p:spTree>
     <p:extLst>
       <p:ext uri="{BB962C8B-B14F-4D97-AF65-F5344CB8AC3E}">
-        <p14:creationId xmlns:p14="http://schemas.microsoft.com/office/powerpoint/2010/main" val="1318971849"/>
+        <p14:creationId xmlns:p14="http://schemas.microsoft.com/office/powerpoint/2010/main" val="52406674"/>
       </p:ext>
     </p:extLst>
   </p:cSld>
@@ -4485,303 +4737,6 @@
       </p:par>
     </p:tnLst>
   </p:timing>
-</p:sld>
-</file>
-
-<file path=ppt/slides/slide18.xml><?xml version="1.0" encoding="utf-8"?>
-<p:sld xmlns:a="http://schemas.openxmlformats.org/drawingml/2006/main" xmlns:r="http://schemas.openxmlformats.org/officeDocument/2006/relationships" xmlns:p="http://schemas.openxmlformats.org/presentationml/2006/main">
-  <p:cSld>
-    <p:spTree>
-      <p:nvGrpSpPr>
-        <p:cNvPr id="1" name=""/>
-        <p:cNvGrpSpPr/>
-        <p:nvPr/>
-      </p:nvGrpSpPr>
-      <p:grpSpPr>
-        <a:xfrm>
-          <a:off x="0" y="0"/>
-          <a:ext cx="0" cy="0"/>
-          <a:chOff x="0" y="0"/>
-          <a:chExt cx="0" cy="0"/>
-        </a:xfrm>
-      </p:grpSpPr>
-      <p:sp>
-        <p:nvSpPr>
-          <p:cNvPr id="2" name="Title 1"/>
-          <p:cNvSpPr>
-            <a:spLocks noGrp="1"/>
-          </p:cNvSpPr>
-          <p:nvPr>
-            <p:ph type="title"/>
-          </p:nvPr>
-        </p:nvSpPr>
-        <p:spPr/>
-        <p:txBody>
-          <a:bodyPr/>
-          <a:lstStyle/>
-          <a:p>
-            <a:r>
-              <a:rPr lang="en-US" dirty="0" smtClean="0"/>
-              <a:t>Keyboard to display</a:t>
-            </a:r>
-            <a:endParaRPr lang="en-US" dirty="0"/>
-          </a:p>
-        </p:txBody>
-      </p:sp>
-      <p:pic>
-        <p:nvPicPr>
-          <p:cNvPr id="8194" name="Picture 2" descr="ttps://cartwrightlab.wikispaces.com/file/view/535px-Stdstreams-notitle.svg.png/255940126/535px-Stdstream"/>
-          <p:cNvPicPr>
-            <a:picLocks noChangeAspect="1" noChangeArrowheads="1"/>
-          </p:cNvPicPr>
-          <p:nvPr/>
-        </p:nvPicPr>
-        <p:blipFill>
-          <a:blip r:embed="rId2">
-            <a:extLst>
-              <a:ext uri="{28A0092B-C50C-407E-A947-70E740481C1C}">
-                <a14:useLocalDpi xmlns:a14="http://schemas.microsoft.com/office/drawing/2010/main" val="0"/>
-              </a:ext>
-            </a:extLst>
-          </a:blip>
-          <a:srcRect/>
-          <a:stretch>
-            <a:fillRect/>
-          </a:stretch>
-        </p:blipFill>
-        <p:spPr bwMode="auto">
-          <a:xfrm>
-            <a:off x="3738568" y="1676407"/>
-            <a:ext cx="8428390" cy="5167312"/>
-          </a:xfrm>
-          <a:prstGeom prst="rect">
-            <a:avLst/>
-          </a:prstGeom>
-          <a:noFill/>
-          <a:extLst>
-            <a:ext uri="{909E8E84-426E-40DD-AFC4-6F175D3DCCD1}">
-              <a14:hiddenFill xmlns:a14="http://schemas.microsoft.com/office/drawing/2010/main">
-                <a:solidFill>
-                  <a:srgbClr val="FFFFFF"/>
-                </a:solidFill>
-              </a14:hiddenFill>
-            </a:ext>
-          </a:extLst>
-        </p:spPr>
-      </p:pic>
-      <p:sp>
-        <p:nvSpPr>
-          <p:cNvPr id="5" name="Rectangle 4"/>
-          <p:cNvSpPr/>
-          <p:nvPr/>
-        </p:nvSpPr>
-        <p:spPr>
-          <a:xfrm>
-            <a:off x="547688" y="2119997"/>
-            <a:ext cx="6096000" cy="1015663"/>
-          </a:xfrm>
-          <a:prstGeom prst="rect">
-            <a:avLst/>
-          </a:prstGeom>
-        </p:spPr>
-        <p:txBody>
-          <a:bodyPr>
-            <a:spAutoFit/>
-          </a:bodyPr>
-          <a:lstStyle/>
-          <a:p>
-            <a:pPr marL="285750" indent="-285750">
-              <a:buFont typeface="Arial" charset="0"/>
-              <a:buChar char="•"/>
-            </a:pPr>
-            <a:r>
-              <a:rPr lang="en-US" sz="2000" dirty="0"/>
-              <a:t>pipes </a:t>
-            </a:r>
-            <a:r>
-              <a:rPr lang="mr-IN" sz="2000" dirty="0"/>
-              <a:t>–</a:t>
-            </a:r>
-            <a:r>
-              <a:rPr lang="en-US" sz="2000" dirty="0"/>
-              <a:t> |</a:t>
-            </a:r>
-          </a:p>
-          <a:p>
-            <a:pPr marL="285750" indent="-285750">
-              <a:buFont typeface="Arial" charset="0"/>
-              <a:buChar char="•"/>
-            </a:pPr>
-            <a:r>
-              <a:rPr lang="en-US" sz="2000" dirty="0"/>
-              <a:t>redirects - &gt; &lt; &lt;&lt; </a:t>
-            </a:r>
-            <a:r>
-              <a:rPr lang="en-US" sz="2000" dirty="0" smtClean="0"/>
-              <a:t>&gt;&gt;</a:t>
-            </a:r>
-          </a:p>
-          <a:p>
-            <a:pPr marL="285750" indent="-285750">
-              <a:buFont typeface="Arial" charset="0"/>
-              <a:buChar char="•"/>
-            </a:pPr>
-            <a:r>
-              <a:rPr lang="en-US" sz="2000" dirty="0" smtClean="0"/>
-              <a:t>Separating streams </a:t>
-            </a:r>
-            <a:r>
-              <a:rPr lang="mr-IN" sz="2000" dirty="0" smtClean="0"/>
-              <a:t>–</a:t>
-            </a:r>
-            <a:r>
-              <a:rPr lang="en-US" sz="2000" dirty="0" smtClean="0"/>
-              <a:t> 1&gt; 2&gt;</a:t>
-            </a:r>
-            <a:endParaRPr lang="en-US" sz="2000" dirty="0"/>
-          </a:p>
-        </p:txBody>
-      </p:sp>
-    </p:spTree>
-    <p:extLst>
-      <p:ext uri="{BB962C8B-B14F-4D97-AF65-F5344CB8AC3E}">
-        <p14:creationId xmlns:p14="http://schemas.microsoft.com/office/powerpoint/2010/main" val="135536529"/>
-      </p:ext>
-    </p:extLst>
-  </p:cSld>
-  <p:clrMapOvr>
-    <a:masterClrMapping/>
-  </p:clrMapOvr>
-  <p:timing>
-    <p:tnLst>
-      <p:par>
-        <p:cTn id="1" dur="indefinite" restart="never" nodeType="tmRoot"/>
-      </p:par>
-    </p:tnLst>
-  </p:timing>
-</p:sld>
-</file>
-
-<file path=ppt/slides/slide19.xml><?xml version="1.0" encoding="utf-8"?>
-<p:sld xmlns:a="http://schemas.openxmlformats.org/drawingml/2006/main" xmlns:r="http://schemas.openxmlformats.org/officeDocument/2006/relationships" xmlns:p="http://schemas.openxmlformats.org/presentationml/2006/main">
-  <p:cSld>
-    <p:spTree>
-      <p:nvGrpSpPr>
-        <p:cNvPr id="1" name=""/>
-        <p:cNvGrpSpPr/>
-        <p:nvPr/>
-      </p:nvGrpSpPr>
-      <p:grpSpPr>
-        <a:xfrm>
-          <a:off x="0" y="0"/>
-          <a:ext cx="0" cy="0"/>
-          <a:chOff x="0" y="0"/>
-          <a:chExt cx="0" cy="0"/>
-        </a:xfrm>
-      </p:grpSpPr>
-      <p:sp>
-        <p:nvSpPr>
-          <p:cNvPr id="2" name="Title 1"/>
-          <p:cNvSpPr>
-            <a:spLocks noGrp="1"/>
-          </p:cNvSpPr>
-          <p:nvPr>
-            <p:ph type="title"/>
-          </p:nvPr>
-        </p:nvSpPr>
-        <p:spPr/>
-        <p:txBody>
-          <a:bodyPr/>
-          <a:lstStyle/>
-          <a:p>
-            <a:r>
-              <a:rPr lang="en-US" dirty="0" smtClean="0"/>
-              <a:t>System monitoring tools</a:t>
-            </a:r>
-            <a:endParaRPr lang="en-US" dirty="0"/>
-          </a:p>
-        </p:txBody>
-      </p:sp>
-      <p:sp>
-        <p:nvSpPr>
-          <p:cNvPr id="3" name="Content Placeholder 2"/>
-          <p:cNvSpPr>
-            <a:spLocks noGrp="1"/>
-          </p:cNvSpPr>
-          <p:nvPr>
-            <p:ph idx="1"/>
-          </p:nvPr>
-        </p:nvSpPr>
-        <p:spPr/>
-        <p:txBody>
-          <a:bodyPr/>
-          <a:lstStyle/>
-          <a:p>
-            <a:r>
-              <a:rPr lang="en-US" dirty="0" smtClean="0"/>
-              <a:t>Install </a:t>
-            </a:r>
-            <a:r>
-              <a:rPr lang="en-US" dirty="0" err="1" smtClean="0"/>
-              <a:t>htop</a:t>
-            </a:r>
-            <a:endParaRPr lang="en-US" dirty="0" smtClean="0"/>
-          </a:p>
-          <a:p>
-            <a:r>
-              <a:rPr lang="en-US" dirty="0" smtClean="0"/>
-              <a:t>Memory and CPU usage</a:t>
-            </a:r>
-          </a:p>
-          <a:p>
-            <a:r>
-              <a:rPr lang="en-US" dirty="0" smtClean="0"/>
-              <a:t>What is SWAP?</a:t>
-            </a:r>
-          </a:p>
-          <a:p>
-            <a:r>
-              <a:rPr lang="en-US" dirty="0" err="1" smtClean="0"/>
-              <a:t>Killining</a:t>
-            </a:r>
-            <a:r>
-              <a:rPr lang="en-US" dirty="0" smtClean="0"/>
-              <a:t> process </a:t>
-            </a:r>
-            <a:r>
-              <a:rPr lang="mr-IN" dirty="0" smtClean="0"/>
-              <a:t>–</a:t>
-            </a:r>
-            <a:r>
-              <a:rPr lang="en-US" dirty="0" smtClean="0"/>
-              <a:t> ctrl-c, </a:t>
-            </a:r>
-            <a:r>
-              <a:rPr lang="en-US" dirty="0" err="1" smtClean="0"/>
-              <a:t>ps</a:t>
-            </a:r>
-            <a:r>
-              <a:rPr lang="en-US" dirty="0" smtClean="0"/>
-              <a:t>, </a:t>
-            </a:r>
-            <a:r>
-              <a:rPr lang="en-US" dirty="0" err="1" smtClean="0"/>
-              <a:t>htop</a:t>
-            </a:r>
-            <a:endParaRPr lang="en-US" dirty="0"/>
-          </a:p>
-        </p:txBody>
-      </p:sp>
-    </p:spTree>
-    <p:extLst>
-      <p:ext uri="{BB962C8B-B14F-4D97-AF65-F5344CB8AC3E}">
-        <p14:creationId xmlns:p14="http://schemas.microsoft.com/office/powerpoint/2010/main" val="52406674"/>
-      </p:ext>
-    </p:extLst>
-  </p:cSld>
-  <p:clrMapOvr>
-    <a:masterClrMapping/>
-  </p:clrMapOvr>
 </p:sld>
 </file>
 
@@ -5057,9 +5012,58 @@
           <a:chExt cx="0" cy="0"/>
         </a:xfrm>
       </p:grpSpPr>
+      <p:sp>
+        <p:nvSpPr>
+          <p:cNvPr id="5" name="Content Placeholder 2"/>
+          <p:cNvSpPr>
+            <a:spLocks noGrp="1"/>
+          </p:cNvSpPr>
+          <p:nvPr>
+            <p:ph idx="1"/>
+          </p:nvPr>
+        </p:nvSpPr>
+        <p:spPr>
+          <a:xfrm>
+            <a:off x="838200" y="1825625"/>
+            <a:ext cx="4800600" cy="4351338"/>
+          </a:xfrm>
+        </p:spPr>
+        <p:txBody>
+          <a:bodyPr/>
+          <a:lstStyle/>
+          <a:p>
+            <a:pPr marL="0" marR="0" lvl="0" indent="0" defTabSz="914400" eaLnBrk="1" fontAlgn="auto" latinLnBrk="0" hangingPunct="1">
+              <a:lnSpc>
+                <a:spcPct val="100000"/>
+              </a:lnSpc>
+              <a:spcBef>
+                <a:spcPts val="0"/>
+              </a:spcBef>
+              <a:spcAft>
+                <a:spcPts val="0"/>
+              </a:spcAft>
+              <a:buClrTx/>
+              <a:buSzTx/>
+              <a:buFontTx/>
+              <a:buNone/>
+              <a:tabLst/>
+              <a:defRPr/>
+            </a:pPr>
+            <a:r>
+              <a:rPr lang="en-US" dirty="0" smtClean="0"/>
+              <a:t>I’ll walk you through the installation, but</a:t>
+            </a:r>
+            <a:r>
+              <a:rPr lang="mr-IN" dirty="0" smtClean="0"/>
+              <a:t>…</a:t>
+            </a:r>
+            <a:endParaRPr lang="en-US" dirty="0" smtClean="0"/>
+          </a:p>
+        </p:txBody>
+      </p:sp>
       <p:pic>
         <p:nvPicPr>
-          <p:cNvPr id="1026" name="Picture 2" descr="ttps://imgs.xkcd.com/comics/tech_support_cheat_sheet.png"/>
+          <p:cNvPr id="2" name="Picture 2" descr="ttps://imgs.xkcd.com/comics/tech_support_cheat_sheet.png"/>
           <p:cNvPicPr>
             <a:picLocks noChangeAspect="1" noChangeArrowheads="1"/>
           </p:cNvPicPr>
@@ -5080,8 +5084,8 @@
         </p:blipFill>
         <p:spPr bwMode="auto">
           <a:xfrm>
-            <a:off x="5892800" y="-9525"/>
-            <a:ext cx="6105525" cy="6867525"/>
+            <a:off x="5917202" y="0"/>
+            <a:ext cx="6093823" cy="6858000"/>
           </a:xfrm>
           <a:prstGeom prst="rect">
             <a:avLst/>
@@ -5098,55 +5102,6 @@
           </a:extLst>
         </p:spPr>
       </p:pic>
-      <p:sp>
-        <p:nvSpPr>
-          <p:cNvPr id="5" name="Content Placeholder 2"/>
-          <p:cNvSpPr>
-            <a:spLocks noGrp="1"/>
-          </p:cNvSpPr>
-          <p:nvPr>
-            <p:ph idx="1"/>
-          </p:nvPr>
-        </p:nvSpPr>
-        <p:spPr>
-          <a:xfrm>
-            <a:off x="838200" y="1825625"/>
-            <a:ext cx="4800600" cy="4351338"/>
-          </a:xfrm>
-        </p:spPr>
-        <p:txBody>
-          <a:bodyPr/>
-          <a:lstStyle/>
-          <a:p>
-            <a:pPr marL="0" marR="0" lvl="0" indent="0" defTabSz="914400" eaLnBrk="1" fontAlgn="auto" latinLnBrk="0" hangingPunct="1">
-              <a:lnSpc>
-                <a:spcPct val="100000"/>
-              </a:lnSpc>
-              <a:spcBef>
-                <a:spcPts val="0"/>
-              </a:spcBef>
-              <a:spcAft>
-                <a:spcPts val="0"/>
-              </a:spcAft>
-              <a:buClrTx/>
-              <a:buSzTx/>
-              <a:buFontTx/>
-              <a:buNone/>
-              <a:tabLst/>
-              <a:defRPr/>
-            </a:pPr>
-            <a:r>
-              <a:rPr lang="en-US" dirty="0" smtClean="0"/>
-              <a:t>I’ll walk you through the installation, but</a:t>
-            </a:r>
-            <a:r>
-              <a:rPr lang="mr-IN" dirty="0" smtClean="0"/>
-              <a:t>…</a:t>
-            </a:r>
-            <a:endParaRPr lang="en-US" dirty="0" smtClean="0"/>
-          </a:p>
-        </p:txBody>
-      </p:sp>
     </p:spTree>
     <p:extLst>
       <p:ext uri="{BB962C8B-B14F-4D97-AF65-F5344CB8AC3E}">
@@ -5309,7 +5264,7 @@
       </p:grpSpPr>
       <p:pic>
         <p:nvPicPr>
-          <p:cNvPr id="2050" name="Picture 2" descr="ttp://www.gocit.vn/wp-content/uploads/2015/09/Linux-file-system-hierarchy-Linux-file-structure-optimized"/>
+          <p:cNvPr id="2" name="Picture 2" descr="ttp://www.gocit.vn/wp-content/uploads/2015/09/Linux-file-system-hierarchy-Linux-file-structure-optimized"/>
           <p:cNvPicPr>
             <a:picLocks noChangeAspect="1" noChangeArrowheads="1"/>
           </p:cNvPicPr>
@@ -5330,7 +5285,7 @@
         </p:blipFill>
         <p:spPr bwMode="auto">
           <a:xfrm>
-            <a:off x="906509" y="0"/>
+            <a:off x="800099" y="0"/>
             <a:ext cx="10599691" cy="6858000"/>
           </a:xfrm>
           <a:prstGeom prst="rect">
@@ -5387,7 +5342,7 @@
       </p:grpSpPr>
       <p:pic>
         <p:nvPicPr>
-          <p:cNvPr id="2050" name="Picture 2" descr="ttp://www.gocit.vn/wp-content/uploads/2015/09/Linux-file-system-hierarchy-Linux-file-structure-optimized"/>
+          <p:cNvPr id="4" name="Picture 2" descr="ttp://www.gocit.vn/wp-content/uploads/2015/09/Linux-file-system-hierarchy-Linux-file-structure-optimized"/>
           <p:cNvPicPr>
             <a:picLocks noChangeAspect="1" noChangeArrowheads="1"/>
           </p:cNvPicPr>
@@ -5408,7 +5363,7 @@
         </p:blipFill>
         <p:spPr bwMode="auto">
           <a:xfrm>
-            <a:off x="906509" y="0"/>
+            <a:off x="800099" y="0"/>
             <a:ext cx="10599691" cy="6858000"/>
           </a:xfrm>
           <a:prstGeom prst="rect">
@@ -5501,7 +5456,7 @@
       </p:grpSpPr>
       <p:pic>
         <p:nvPicPr>
-          <p:cNvPr id="2050" name="Picture 2" descr="ttp://www.gocit.vn/wp-content/uploads/2015/09/Linux-file-system-hierarchy-Linux-file-structure-optimized"/>
+          <p:cNvPr id="8" name="Picture 2" descr="ttp://www.gocit.vn/wp-content/uploads/2015/09/Linux-file-system-hierarchy-Linux-file-structure-optimized"/>
           <p:cNvPicPr>
             <a:picLocks noChangeAspect="1" noChangeArrowheads="1"/>
           </p:cNvPicPr>
@@ -5522,7 +5477,7 @@
         </p:blipFill>
         <p:spPr bwMode="auto">
           <a:xfrm>
-            <a:off x="906509" y="0"/>
+            <a:off x="800099" y="0"/>
             <a:ext cx="10599691" cy="6858000"/>
           </a:xfrm>
           <a:prstGeom prst="rect">
@@ -5723,7 +5678,7 @@
       </p:grpSpPr>
       <p:pic>
         <p:nvPicPr>
-          <p:cNvPr id="2050" name="Picture 2" descr="ttp://www.gocit.vn/wp-content/uploads/2015/09/Linux-file-system-hierarchy-Linux-file-structure-optimized"/>
+          <p:cNvPr id="8" name="Picture 2" descr="ttp://www.gocit.vn/wp-content/uploads/2015/09/Linux-file-system-hierarchy-Linux-file-structure-optimized"/>
           <p:cNvPicPr>
             <a:picLocks noChangeAspect="1" noChangeArrowheads="1"/>
           </p:cNvPicPr>
@@ -5744,7 +5699,7 @@
         </p:blipFill>
         <p:spPr bwMode="auto">
           <a:xfrm>
-            <a:off x="906509" y="0"/>
+            <a:off x="800099" y="0"/>
             <a:ext cx="10599691" cy="6858000"/>
           </a:xfrm>
           <a:prstGeom prst="rect">
@@ -6229,4 +6184,265 @@
     </a:ext>
   </a:extLst>
 </a:theme>
+</file>
+
+<file path=ppt/theme/theme2.xml><?xml version="1.0" encoding="utf-8"?>
+<a:theme xmlns:a="http://schemas.openxmlformats.org/drawingml/2006/main" name="Office Theme">
+  <a:themeElements>
+    <a:clrScheme name="Office">
+      <a:dk1>
+        <a:sysClr val="windowText" lastClr="000000"/>
+      </a:dk1>
+      <a:lt1>
+        <a:sysClr val="window" lastClr="FFFFFF"/>
+      </a:lt1>
+      <a:dk2>
+        <a:srgbClr val="44546A"/>
+      </a:dk2>
+      <a:lt2>
+        <a:srgbClr val="E7E6E6"/>
+      </a:lt2>
+      <a:accent1>
+        <a:srgbClr val="4472C4"/>
+      </a:accent1>
+      <a:accent2>
+        <a:srgbClr val="ED7D31"/>
+      </a:accent2>
+      <a:accent3>
+        <a:srgbClr val="A5A5A5"/>
+      </a:accent3>
+      <a:accent4>
+        <a:srgbClr val="FFC000"/>
+      </a:accent4>
+      <a:accent5>
+        <a:srgbClr val="5B9BD5"/>
+      </a:accent5>
+      <a:accent6>
+        <a:srgbClr val="70AD47"/>
+      </a:accent6>
+      <a:hlink>
+        <a:srgbClr val="0563C1"/>
+      </a:hlink>
+      <a:folHlink>
+        <a:srgbClr val="954F72"/>
+      </a:folHlink>
+    </a:clrScheme>
+    <a:fontScheme name="Office">
+      <a:majorFont>
+        <a:latin typeface="Calibri Light" panose="020F0302020204030204"/>
+        <a:ea typeface=""/>
+        <a:cs typeface=""/>
+        <a:font script="Jpan" typeface="Yu Gothic Light"/>
+        <a:font script="Hang" typeface="맑은 고딕"/>
+        <a:font script="Hans" typeface="DengXian Light"/>
+        <a:font script="Hant" typeface="新細明體"/>
+        <a:font script="Arab" typeface="Times New Roman"/>
+        <a:font script="Hebr" typeface="Times New Roman"/>
+        <a:font script="Thai" typeface="Angsana New"/>
+        <a:font script="Ethi" typeface="Nyala"/>
+        <a:font script="Beng" typeface="Vrinda"/>
+        <a:font script="Gujr" typeface="Shruti"/>
+        <a:font script="Khmr" typeface="MoolBoran"/>
+        <a:font script="Knda" typeface="Tunga"/>
+        <a:font script="Guru" typeface="Raavi"/>
+        <a:font script="Cans" typeface="Euphemia"/>
+        <a:font script="Cher" typeface="Plantagenet Cherokee"/>
+        <a:font script="Yiii" typeface="Microsoft Yi Baiti"/>
+        <a:font script="Tibt" typeface="Microsoft Himalaya"/>
+        <a:font script="Thaa" typeface="MV Boli"/>
+        <a:font script="Deva" typeface="Mangal"/>
+        <a:font script="Telu" typeface="Gautami"/>
+        <a:font script="Taml" typeface="Latha"/>
+        <a:font script="Syrc" typeface="Estrangelo Edessa"/>
+        <a:font script="Orya" typeface="Kalinga"/>
+        <a:font script="Mlym" typeface="Kartika"/>
+        <a:font script="Laoo" typeface="DokChampa"/>
+        <a:font script="Sinh" typeface="Iskoola Pota"/>
+        <a:font script="Mong" typeface="Mongolian Baiti"/>
+        <a:font script="Viet" typeface="Times New Roman"/>
+        <a:font script="Uigh" typeface="Microsoft Uighur"/>
+        <a:font script="Geor" typeface="Sylfaen"/>
+      </a:majorFont>
+      <a:minorFont>
+        <a:latin typeface="Calibri" panose="020F0502020204030204"/>
+        <a:ea typeface=""/>
+        <a:cs typeface=""/>
+        <a:font script="Jpan" typeface="Yu Gothic"/>
+        <a:font script="Hang" typeface="맑은 고딕"/>
+        <a:font script="Hans" typeface="DengXian"/>
+        <a:font script="Hant" typeface="新細明體"/>
+        <a:font script="Arab" typeface="Arial"/>
+        <a:font script="Hebr" typeface="Arial"/>
+        <a:font script="Thai" typeface="Cordia New"/>
+        <a:font script="Ethi" typeface="Nyala"/>
+        <a:font script="Beng" typeface="Vrinda"/>
+        <a:font script="Gujr" typeface="Shruti"/>
+        <a:font script="Khmr" typeface="DaunPenh"/>
+        <a:font script="Knda" typeface="Tunga"/>
+        <a:font script="Guru" typeface="Raavi"/>
+        <a:font script="Cans" typeface="Euphemia"/>
+        <a:font script="Cher" typeface="Plantagenet Cherokee"/>
+        <a:font script="Yiii" typeface="Microsoft Yi Baiti"/>
+        <a:font script="Tibt" typeface="Microsoft Himalaya"/>
+        <a:font script="Thaa" typeface="MV Boli"/>
+        <a:font script="Deva" typeface="Mangal"/>
+        <a:font script="Telu" typeface="Gautami"/>
+        <a:font script="Taml" typeface="Latha"/>
+        <a:font script="Syrc" typeface="Estrangelo Edessa"/>
+        <a:font script="Orya" typeface="Kalinga"/>
+        <a:font script="Mlym" typeface="Kartika"/>
+        <a:font script="Laoo" typeface="DokChampa"/>
+        <a:font script="Sinh" typeface="Iskoola Pota"/>
+        <a:font script="Mong" typeface="Mongolian Baiti"/>
+        <a:font script="Viet" typeface="Arial"/>
+        <a:font script="Uigh" typeface="Microsoft Uighur"/>
+        <a:font script="Geor" typeface="Sylfaen"/>
+      </a:minorFont>
+    </a:fontScheme>
+    <a:fmtScheme name="Office">
+      <a:fillStyleLst>
+        <a:solidFill>
+          <a:schemeClr val="phClr"/>
+        </a:solidFill>
+        <a:gradFill rotWithShape="1">
+          <a:gsLst>
+            <a:gs pos="0">
+              <a:schemeClr val="phClr">
+                <a:lumMod val="110000"/>
+                <a:satMod val="105000"/>
+                <a:tint val="67000"/>
+              </a:schemeClr>
+            </a:gs>
+            <a:gs pos="50000">
+              <a:schemeClr val="phClr">
+                <a:lumMod val="105000"/>
+                <a:satMod val="103000"/>
+                <a:tint val="73000"/>
+              </a:schemeClr>
+            </a:gs>
+            <a:gs pos="100000">
+              <a:schemeClr val="phClr">
+                <a:lumMod val="105000"/>
+                <a:satMod val="109000"/>
+                <a:tint val="81000"/>
+              </a:schemeClr>
+            </a:gs>
+          </a:gsLst>
+          <a:lin ang="5400000" scaled="0"/>
+        </a:gradFill>
+        <a:gradFill rotWithShape="1">
+          <a:gsLst>
+            <a:gs pos="0">
+              <a:schemeClr val="phClr">
+                <a:satMod val="103000"/>
+                <a:lumMod val="102000"/>
+                <a:tint val="94000"/>
+              </a:schemeClr>
+            </a:gs>
+            <a:gs pos="50000">
+              <a:schemeClr val="phClr">
+                <a:satMod val="110000"/>
+                <a:lumMod val="100000"/>
+                <a:shade val="100000"/>
+              </a:schemeClr>
+            </a:gs>
+            <a:gs pos="100000">
+              <a:schemeClr val="phClr">
+                <a:lumMod val="99000"/>
+                <a:satMod val="120000"/>
+                <a:shade val="78000"/>
+              </a:schemeClr>
+            </a:gs>
+          </a:gsLst>
+          <a:lin ang="5400000" scaled="0"/>
+        </a:gradFill>
+      </a:fillStyleLst>
+      <a:lnStyleLst>
+        <a:ln w="6350" cap="flat" cmpd="sng" algn="ctr">
+          <a:solidFill>
+            <a:schemeClr val="phClr"/>
+          </a:solidFill>
+          <a:prstDash val="solid"/>
+          <a:miter lim="800000"/>
+        </a:ln>
+        <a:ln w="12700" cap="flat" cmpd="sng" algn="ctr">
+          <a:solidFill>
+            <a:schemeClr val="phClr"/>
+          </a:solidFill>
+          <a:prstDash val="solid"/>
+          <a:miter lim="800000"/>
+        </a:ln>
+        <a:ln w="19050" cap="flat" cmpd="sng" algn="ctr">
+          <a:solidFill>
+            <a:schemeClr val="phClr"/>
+          </a:solidFill>
+          <a:prstDash val="solid"/>
+          <a:miter lim="800000"/>
+        </a:ln>
+      </a:lnStyleLst>
+      <a:effectStyleLst>
+        <a:effectStyle>
+          <a:effectLst/>
+        </a:effectStyle>
+        <a:effectStyle>
+          <a:effectLst/>
+        </a:effectStyle>
+        <a:effectStyle>
+          <a:effectLst>
+            <a:outerShdw blurRad="57150" dist="19050" dir="5400000" algn="ctr" rotWithShape="0">
+              <a:srgbClr val="000000">
+                <a:alpha val="63000"/>
+              </a:srgbClr>
+            </a:outerShdw>
+          </a:effectLst>
+        </a:effectStyle>
+      </a:effectStyleLst>
+      <a:bgFillStyleLst>
+        <a:solidFill>
+          <a:schemeClr val="phClr"/>
+        </a:solidFill>
+        <a:solidFill>
+          <a:schemeClr val="phClr">
+            <a:tint val="95000"/>
+            <a:satMod val="170000"/>
+          </a:schemeClr>
+        </a:solidFill>
+        <a:gradFill rotWithShape="1">
+          <a:gsLst>
+            <a:gs pos="0">
+              <a:schemeClr val="phClr">
+                <a:tint val="93000"/>
+                <a:satMod val="150000"/>
+                <a:shade val="98000"/>
+                <a:lumMod val="102000"/>
+              </a:schemeClr>
+            </a:gs>
+            <a:gs pos="50000">
+              <a:schemeClr val="phClr">
+                <a:tint val="98000"/>
+                <a:satMod val="130000"/>
+                <a:shade val="90000"/>
+                <a:lumMod val="103000"/>
+              </a:schemeClr>
+            </a:gs>
+            <a:gs pos="100000">
+              <a:schemeClr val="phClr">
+                <a:shade val="63000"/>
+                <a:satMod val="120000"/>
+              </a:schemeClr>
+            </a:gs>
+          </a:gsLst>
+          <a:lin ang="5400000" scaled="0"/>
+        </a:gradFill>
+      </a:bgFillStyleLst>
+    </a:fmtScheme>
+  </a:themeElements>
+  <a:objectDefaults/>
+  <a:extraClrSchemeLst/>
+  <a:extLst>
+    <a:ext uri="{05A4C25C-085E-4340-85A3-A5531E510DB2}">
+      <thm15:themeFamily xmlns:thm15="http://schemas.microsoft.com/office/thememl/2012/main" name="Office Theme" id="{62F939B6-93AF-4DB8-9C6B-D6C7DFDC589F}" vid="{4A3C46E8-61CC-4603-A589-7422A47A8E4A}"/>
+    </a:ext>
+  </a:extLst>
+</a:theme>
 </file>
</xml_diff>